<commit_message>
added plan abstraction and normalization
</commit_message>
<xml_diff>
--- a/doc/defense-Dec2015.pptx
+++ b/doc/defense-Dec2015.pptx
@@ -5,10 +5,10 @@
     <p:sldMasterId id="2147483661" r:id="rId1"/>
   </p:sldMasterIdLst>
   <p:notesMasterIdLst>
-    <p:notesMasterId r:id="rId65"/>
+    <p:notesMasterId r:id="rId69"/>
   </p:notesMasterIdLst>
   <p:handoutMasterIdLst>
-    <p:handoutMasterId r:id="rId66"/>
+    <p:handoutMasterId r:id="rId70"/>
   </p:handoutMasterIdLst>
   <p:sldIdLst>
     <p:sldId id="345" r:id="rId2"/>
@@ -66,14 +66,18 @@
     <p:sldId id="368" r:id="rId54"/>
     <p:sldId id="369" r:id="rId55"/>
     <p:sldId id="370" r:id="rId56"/>
-    <p:sldId id="292" r:id="rId57"/>
-    <p:sldId id="306" r:id="rId58"/>
-    <p:sldId id="302" r:id="rId59"/>
-    <p:sldId id="331" r:id="rId60"/>
-    <p:sldId id="291" r:id="rId61"/>
-    <p:sldId id="327" r:id="rId62"/>
-    <p:sldId id="343" r:id="rId63"/>
-    <p:sldId id="344" r:id="rId64"/>
+    <p:sldId id="371" r:id="rId57"/>
+    <p:sldId id="372" r:id="rId58"/>
+    <p:sldId id="373" r:id="rId59"/>
+    <p:sldId id="374" r:id="rId60"/>
+    <p:sldId id="292" r:id="rId61"/>
+    <p:sldId id="306" r:id="rId62"/>
+    <p:sldId id="302" r:id="rId63"/>
+    <p:sldId id="331" r:id="rId64"/>
+    <p:sldId id="291" r:id="rId65"/>
+    <p:sldId id="327" r:id="rId66"/>
+    <p:sldId id="343" r:id="rId67"/>
+    <p:sldId id="344" r:id="rId68"/>
   </p:sldIdLst>
   <p:sldSz cx="9144000" cy="6858000" type="screen4x3"/>
   <p:notesSz cx="7010400" cy="9296400"/>
@@ -46734,11 +46738,7 @@
             <a:pPr lvl="1"/>
             <a:r>
               <a:rPr lang="en-US" dirty="0" smtClean="0"/>
-              <a:t>Refinement – add step </a:t>
-            </a:r>
-            <a:r>
-              <a:rPr lang="en-US" smtClean="0"/>
-              <a:t>that contribute to goal</a:t>
+              <a:t>Refinement – add step that contribute to goal</a:t>
             </a:r>
             <a:endParaRPr lang="en-US" dirty="0"/>
           </a:p>
@@ -46800,6 +46800,820 @@
       </p:grpSpPr>
       <p:sp>
         <p:nvSpPr>
+          <p:cNvPr id="2" name="Title 1"/>
+          <p:cNvSpPr>
+            <a:spLocks noGrp="1"/>
+          </p:cNvSpPr>
+          <p:nvPr>
+            <p:ph type="title"/>
+          </p:nvPr>
+        </p:nvSpPr>
+        <p:spPr/>
+        <p:txBody>
+          <a:bodyPr/>
+          <a:lstStyle/>
+          <a:p>
+            <a:r>
+              <a:rPr lang="en-US" dirty="0" smtClean="0"/>
+              <a:t>Smoothing</a:t>
+            </a:r>
+            <a:endParaRPr lang="en-US" dirty="0"/>
+          </a:p>
+        </p:txBody>
+      </p:sp>
+      <p:sp>
+        <p:nvSpPr>
+          <p:cNvPr id="3" name="Content Placeholder 2"/>
+          <p:cNvSpPr>
+            <a:spLocks noGrp="1"/>
+          </p:cNvSpPr>
+          <p:nvPr>
+            <p:ph idx="1"/>
+          </p:nvPr>
+        </p:nvSpPr>
+        <p:spPr/>
+        <p:txBody>
+          <a:bodyPr/>
+          <a:lstStyle/>
+          <a:p>
+            <a:r>
+              <a:rPr lang="en-US" dirty="0" smtClean="0"/>
+              <a:t>Correction of heuristic solver inaccuracies</a:t>
+            </a:r>
+          </a:p>
+          <a:p>
+            <a:r>
+              <a:rPr lang="en-US" dirty="0" smtClean="0"/>
+              <a:t>Reduction of unique solutions</a:t>
+            </a:r>
+            <a:endParaRPr lang="en-US" dirty="0"/>
+          </a:p>
+        </p:txBody>
+      </p:sp>
+      <p:sp>
+        <p:nvSpPr>
+          <p:cNvPr id="4" name="Slide Number Placeholder 3"/>
+          <p:cNvSpPr>
+            <a:spLocks noGrp="1"/>
+          </p:cNvSpPr>
+          <p:nvPr>
+            <p:ph type="sldNum" sz="quarter" idx="12"/>
+          </p:nvPr>
+        </p:nvSpPr>
+        <p:spPr/>
+        <p:txBody>
+          <a:bodyPr/>
+          <a:lstStyle/>
+          <a:p>
+            <a:fld id="{A4021D12-FF9D-4360-A285-DE60EDA167B5}" type="slidenum">
+              <a:rPr lang="en-US" altLang="en-US" smtClean="0"/>
+              <a:pPr/>
+              <a:t>56</a:t>
+            </a:fld>
+            <a:endParaRPr lang="en-US" altLang="en-US"/>
+          </a:p>
+        </p:txBody>
+      </p:sp>
+      <p:pic>
+        <p:nvPicPr>
+          <p:cNvPr id="5" name="Picture 4"/>
+          <p:cNvPicPr>
+            <a:picLocks noChangeAspect="1"/>
+          </p:cNvPicPr>
+          <p:nvPr/>
+        </p:nvPicPr>
+        <p:blipFill>
+          <a:blip r:embed="rId2"/>
+          <a:stretch>
+            <a:fillRect/>
+          </a:stretch>
+        </p:blipFill>
+        <p:spPr>
+          <a:xfrm>
+            <a:off x="773906" y="3048000"/>
+            <a:ext cx="7596188" cy="2978795"/>
+          </a:xfrm>
+          <a:prstGeom prst="rect">
+            <a:avLst/>
+          </a:prstGeom>
+        </p:spPr>
+      </p:pic>
+    </p:spTree>
+    <p:extLst>
+      <p:ext uri="{BB962C8B-B14F-4D97-AF65-F5344CB8AC3E}">
+        <p14:creationId xmlns:p14="http://schemas.microsoft.com/office/powerpoint/2010/main" val="3159355937"/>
+      </p:ext>
+    </p:extLst>
+  </p:cSld>
+  <p:clrMapOvr>
+    <a:masterClrMapping/>
+  </p:clrMapOvr>
+</p:sld>
+</file>
+
+<file path=ppt/slides/slide57.xml><?xml version="1.0" encoding="utf-8"?>
+<p:sld xmlns:a="http://schemas.openxmlformats.org/drawingml/2006/main" xmlns:r="http://schemas.openxmlformats.org/officeDocument/2006/relationships" xmlns:p="http://schemas.openxmlformats.org/presentationml/2006/main">
+  <p:cSld>
+    <p:spTree>
+      <p:nvGrpSpPr>
+        <p:cNvPr id="1" name=""/>
+        <p:cNvGrpSpPr/>
+        <p:nvPr/>
+      </p:nvGrpSpPr>
+      <p:grpSpPr>
+        <a:xfrm>
+          <a:off x="0" y="0"/>
+          <a:ext cx="0" cy="0"/>
+          <a:chOff x="0" y="0"/>
+          <a:chExt cx="0" cy="0"/>
+        </a:xfrm>
+      </p:grpSpPr>
+      <p:sp>
+        <p:nvSpPr>
+          <p:cNvPr id="2" name="Title 1"/>
+          <p:cNvSpPr>
+            <a:spLocks noGrp="1"/>
+          </p:cNvSpPr>
+          <p:nvPr>
+            <p:ph type="title"/>
+          </p:nvPr>
+        </p:nvSpPr>
+        <p:spPr/>
+        <p:txBody>
+          <a:bodyPr/>
+          <a:lstStyle/>
+          <a:p>
+            <a:r>
+              <a:rPr lang="en-US" dirty="0" smtClean="0"/>
+              <a:t>Plan Abstraction</a:t>
+            </a:r>
+            <a:endParaRPr lang="en-US" dirty="0"/>
+          </a:p>
+        </p:txBody>
+      </p:sp>
+      <p:sp>
+        <p:nvSpPr>
+          <p:cNvPr id="4" name="Slide Number Placeholder 3"/>
+          <p:cNvSpPr>
+            <a:spLocks noGrp="1"/>
+          </p:cNvSpPr>
+          <p:nvPr>
+            <p:ph type="sldNum" sz="quarter" idx="12"/>
+          </p:nvPr>
+        </p:nvSpPr>
+        <p:spPr/>
+        <p:txBody>
+          <a:bodyPr/>
+          <a:lstStyle/>
+          <a:p>
+            <a:fld id="{A4021D12-FF9D-4360-A285-DE60EDA167B5}" type="slidenum">
+              <a:rPr lang="en-US" altLang="en-US" smtClean="0"/>
+              <a:pPr/>
+              <a:t>57</a:t>
+            </a:fld>
+            <a:endParaRPr lang="en-US" altLang="en-US"/>
+          </a:p>
+        </p:txBody>
+      </p:sp>
+      <p:pic>
+        <p:nvPicPr>
+          <p:cNvPr id="5" name="Picture 4"/>
+          <p:cNvPicPr>
+            <a:picLocks noChangeAspect="1"/>
+          </p:cNvPicPr>
+          <p:nvPr/>
+        </p:nvPicPr>
+        <p:blipFill>
+          <a:blip r:embed="rId2"/>
+          <a:stretch>
+            <a:fillRect/>
+          </a:stretch>
+        </p:blipFill>
+        <p:spPr>
+          <a:xfrm>
+            <a:off x="1981200" y="1445070"/>
+            <a:ext cx="5129213" cy="2228205"/>
+          </a:xfrm>
+          <a:prstGeom prst="rect">
+            <a:avLst/>
+          </a:prstGeom>
+        </p:spPr>
+      </p:pic>
+      <p:pic>
+        <p:nvPicPr>
+          <p:cNvPr id="6" name="Picture 5"/>
+          <p:cNvPicPr>
+            <a:picLocks noChangeAspect="1"/>
+          </p:cNvPicPr>
+          <p:nvPr/>
+        </p:nvPicPr>
+        <p:blipFill>
+          <a:blip r:embed="rId3"/>
+          <a:stretch>
+            <a:fillRect/>
+          </a:stretch>
+        </p:blipFill>
+        <p:spPr>
+          <a:xfrm>
+            <a:off x="1308211" y="5029200"/>
+            <a:ext cx="6475190" cy="1148706"/>
+          </a:xfrm>
+          <a:prstGeom prst="rect">
+            <a:avLst/>
+          </a:prstGeom>
+        </p:spPr>
+      </p:pic>
+      <p:sp>
+        <p:nvSpPr>
+          <p:cNvPr id="7" name="Right Arrow 6"/>
+          <p:cNvSpPr/>
+          <p:nvPr/>
+        </p:nvSpPr>
+        <p:spPr>
+          <a:xfrm rot="5400000">
+            <a:off x="4143932" y="4154787"/>
+            <a:ext cx="803748" cy="294803"/>
+          </a:xfrm>
+          <a:prstGeom prst="rightArrow">
+            <a:avLst/>
+          </a:prstGeom>
+          <a:solidFill>
+            <a:srgbClr val="4D4D4D"/>
+          </a:solidFill>
+          <a:ln>
+            <a:solidFill>
+              <a:schemeClr val="tx1"/>
+            </a:solidFill>
+          </a:ln>
+        </p:spPr>
+        <p:style>
+          <a:lnRef idx="2">
+            <a:schemeClr val="accent1">
+              <a:shade val="50000"/>
+            </a:schemeClr>
+          </a:lnRef>
+          <a:fillRef idx="1">
+            <a:schemeClr val="accent1"/>
+          </a:fillRef>
+          <a:effectRef idx="0">
+            <a:schemeClr val="accent1"/>
+          </a:effectRef>
+          <a:fontRef idx="minor">
+            <a:schemeClr val="lt1"/>
+          </a:fontRef>
+        </p:style>
+        <p:txBody>
+          <a:bodyPr rtlCol="0" anchor="ctr"/>
+          <a:lstStyle/>
+          <a:p>
+            <a:pPr algn="ctr"/>
+            <a:endParaRPr lang="en-US"/>
+          </a:p>
+        </p:txBody>
+      </p:sp>
+    </p:spTree>
+    <p:extLst>
+      <p:ext uri="{BB962C8B-B14F-4D97-AF65-F5344CB8AC3E}">
+        <p14:creationId xmlns:p14="http://schemas.microsoft.com/office/powerpoint/2010/main" val="3144787904"/>
+      </p:ext>
+    </p:extLst>
+  </p:cSld>
+  <p:clrMapOvr>
+    <a:masterClrMapping/>
+  </p:clrMapOvr>
+</p:sld>
+</file>
+
+<file path=ppt/slides/slide58.xml><?xml version="1.0" encoding="utf-8"?>
+<p:sld xmlns:a="http://schemas.openxmlformats.org/drawingml/2006/main" xmlns:r="http://schemas.openxmlformats.org/officeDocument/2006/relationships" xmlns:p="http://schemas.openxmlformats.org/presentationml/2006/main">
+  <p:cSld>
+    <p:spTree>
+      <p:nvGrpSpPr>
+        <p:cNvPr id="1" name=""/>
+        <p:cNvGrpSpPr/>
+        <p:nvPr/>
+      </p:nvGrpSpPr>
+      <p:grpSpPr>
+        <a:xfrm>
+          <a:off x="0" y="0"/>
+          <a:ext cx="0" cy="0"/>
+          <a:chOff x="0" y="0"/>
+          <a:chExt cx="0" cy="0"/>
+        </a:xfrm>
+      </p:grpSpPr>
+      <p:sp>
+        <p:nvSpPr>
+          <p:cNvPr id="2" name="Title 1"/>
+          <p:cNvSpPr>
+            <a:spLocks noGrp="1"/>
+          </p:cNvSpPr>
+          <p:nvPr>
+            <p:ph type="title"/>
+          </p:nvPr>
+        </p:nvSpPr>
+        <p:spPr/>
+        <p:txBody>
+          <a:bodyPr/>
+          <a:lstStyle/>
+          <a:p>
+            <a:r>
+              <a:rPr lang="en-US" dirty="0" smtClean="0"/>
+              <a:t>Plan Normalization</a:t>
+            </a:r>
+            <a:endParaRPr lang="en-US" dirty="0"/>
+          </a:p>
+        </p:txBody>
+      </p:sp>
+      <p:sp>
+        <p:nvSpPr>
+          <p:cNvPr id="4" name="Slide Number Placeholder 3"/>
+          <p:cNvSpPr>
+            <a:spLocks noGrp="1"/>
+          </p:cNvSpPr>
+          <p:nvPr>
+            <p:ph type="sldNum" sz="quarter" idx="12"/>
+          </p:nvPr>
+        </p:nvSpPr>
+        <p:spPr/>
+        <p:txBody>
+          <a:bodyPr/>
+          <a:lstStyle/>
+          <a:p>
+            <a:fld id="{A4021D12-FF9D-4360-A285-DE60EDA167B5}" type="slidenum">
+              <a:rPr lang="en-US" altLang="en-US" smtClean="0"/>
+              <a:pPr/>
+              <a:t>58</a:t>
+            </a:fld>
+            <a:endParaRPr lang="en-US" altLang="en-US"/>
+          </a:p>
+        </p:txBody>
+      </p:sp>
+      <p:pic>
+        <p:nvPicPr>
+          <p:cNvPr id="5" name="Picture 4"/>
+          <p:cNvPicPr>
+            <a:picLocks noChangeAspect="1"/>
+          </p:cNvPicPr>
+          <p:nvPr/>
+        </p:nvPicPr>
+        <p:blipFill>
+          <a:blip r:embed="rId2"/>
+          <a:stretch>
+            <a:fillRect/>
+          </a:stretch>
+        </p:blipFill>
+        <p:spPr>
+          <a:xfrm>
+            <a:off x="1295400" y="1586548"/>
+            <a:ext cx="6115050" cy="1769812"/>
+          </a:xfrm>
+          <a:prstGeom prst="rect">
+            <a:avLst/>
+          </a:prstGeom>
+        </p:spPr>
+      </p:pic>
+      <p:pic>
+        <p:nvPicPr>
+          <p:cNvPr id="6" name="Picture 5"/>
+          <p:cNvPicPr>
+            <a:picLocks noChangeAspect="1"/>
+          </p:cNvPicPr>
+          <p:nvPr/>
+        </p:nvPicPr>
+        <p:blipFill>
+          <a:blip r:embed="rId3"/>
+          <a:stretch>
+            <a:fillRect/>
+          </a:stretch>
+        </p:blipFill>
+        <p:spPr>
+          <a:xfrm>
+            <a:off x="1295400" y="4231867"/>
+            <a:ext cx="6115050" cy="1804441"/>
+          </a:xfrm>
+          <a:prstGeom prst="rect">
+            <a:avLst/>
+          </a:prstGeom>
+        </p:spPr>
+      </p:pic>
+      <p:sp>
+        <p:nvSpPr>
+          <p:cNvPr id="7" name="Right Arrow 6"/>
+          <p:cNvSpPr/>
+          <p:nvPr/>
+        </p:nvSpPr>
+        <p:spPr>
+          <a:xfrm rot="5400000">
+            <a:off x="3951051" y="3587519"/>
+            <a:ext cx="803748" cy="294803"/>
+          </a:xfrm>
+          <a:prstGeom prst="rightArrow">
+            <a:avLst/>
+          </a:prstGeom>
+          <a:solidFill>
+            <a:srgbClr val="4D4D4D"/>
+          </a:solidFill>
+          <a:ln>
+            <a:solidFill>
+              <a:schemeClr val="tx1"/>
+            </a:solidFill>
+          </a:ln>
+        </p:spPr>
+        <p:style>
+          <a:lnRef idx="2">
+            <a:schemeClr val="accent1">
+              <a:shade val="50000"/>
+            </a:schemeClr>
+          </a:lnRef>
+          <a:fillRef idx="1">
+            <a:schemeClr val="accent1"/>
+          </a:fillRef>
+          <a:effectRef idx="0">
+            <a:schemeClr val="accent1"/>
+          </a:effectRef>
+          <a:fontRef idx="minor">
+            <a:schemeClr val="lt1"/>
+          </a:fontRef>
+        </p:style>
+        <p:txBody>
+          <a:bodyPr rtlCol="0" anchor="ctr"/>
+          <a:lstStyle/>
+          <a:p>
+            <a:pPr algn="ctr"/>
+            <a:endParaRPr lang="en-US"/>
+          </a:p>
+        </p:txBody>
+      </p:sp>
+    </p:spTree>
+    <p:extLst>
+      <p:ext uri="{BB962C8B-B14F-4D97-AF65-F5344CB8AC3E}">
+        <p14:creationId xmlns:p14="http://schemas.microsoft.com/office/powerpoint/2010/main" val="1428087879"/>
+      </p:ext>
+    </p:extLst>
+  </p:cSld>
+  <p:clrMapOvr>
+    <a:masterClrMapping/>
+  </p:clrMapOvr>
+</p:sld>
+</file>
+
+<file path=ppt/slides/slide59.xml><?xml version="1.0" encoding="utf-8"?>
+<p:sld xmlns:a="http://schemas.openxmlformats.org/drawingml/2006/main" xmlns:r="http://schemas.openxmlformats.org/officeDocument/2006/relationships" xmlns:p="http://schemas.openxmlformats.org/presentationml/2006/main">
+  <p:cSld>
+    <p:spTree>
+      <p:nvGrpSpPr>
+        <p:cNvPr id="1" name=""/>
+        <p:cNvGrpSpPr/>
+        <p:nvPr/>
+      </p:nvGrpSpPr>
+      <p:grpSpPr>
+        <a:xfrm>
+          <a:off x="0" y="0"/>
+          <a:ext cx="0" cy="0"/>
+          <a:chOff x="0" y="0"/>
+          <a:chExt cx="0" cy="0"/>
+        </a:xfrm>
+      </p:grpSpPr>
+      <p:sp>
+        <p:nvSpPr>
+          <p:cNvPr id="2" name="Title 1"/>
+          <p:cNvSpPr>
+            <a:spLocks noGrp="1"/>
+          </p:cNvSpPr>
+          <p:nvPr>
+            <p:ph type="title"/>
+          </p:nvPr>
+        </p:nvSpPr>
+        <p:spPr/>
+        <p:txBody>
+          <a:bodyPr/>
+          <a:lstStyle/>
+          <a:p>
+            <a:r>
+              <a:rPr lang="en-US" dirty="0" smtClean="0"/>
+              <a:t>Results</a:t>
+            </a:r>
+            <a:endParaRPr lang="en-US" dirty="0"/>
+          </a:p>
+        </p:txBody>
+      </p:sp>
+      <p:sp>
+        <p:nvSpPr>
+          <p:cNvPr id="3" name="Content Placeholder 2"/>
+          <p:cNvSpPr>
+            <a:spLocks noGrp="1"/>
+          </p:cNvSpPr>
+          <p:nvPr>
+            <p:ph idx="1"/>
+          </p:nvPr>
+        </p:nvSpPr>
+        <p:spPr/>
+        <p:txBody>
+          <a:bodyPr/>
+          <a:lstStyle/>
+          <a:p>
+            <a:endParaRPr lang="en-US"/>
+          </a:p>
+        </p:txBody>
+      </p:sp>
+      <p:sp>
+        <p:nvSpPr>
+          <p:cNvPr id="4" name="Slide Number Placeholder 3"/>
+          <p:cNvSpPr>
+            <a:spLocks noGrp="1"/>
+          </p:cNvSpPr>
+          <p:nvPr>
+            <p:ph type="sldNum" sz="quarter" idx="12"/>
+          </p:nvPr>
+        </p:nvSpPr>
+        <p:spPr/>
+        <p:txBody>
+          <a:bodyPr/>
+          <a:lstStyle/>
+          <a:p>
+            <a:fld id="{A4021D12-FF9D-4360-A285-DE60EDA167B5}" type="slidenum">
+              <a:rPr lang="en-US" altLang="en-US" smtClean="0"/>
+              <a:pPr/>
+              <a:t>59</a:t>
+            </a:fld>
+            <a:endParaRPr lang="en-US" altLang="en-US"/>
+          </a:p>
+        </p:txBody>
+      </p:sp>
+    </p:spTree>
+    <p:extLst>
+      <p:ext uri="{BB962C8B-B14F-4D97-AF65-F5344CB8AC3E}">
+        <p14:creationId xmlns:p14="http://schemas.microsoft.com/office/powerpoint/2010/main" val="1079624071"/>
+      </p:ext>
+    </p:extLst>
+  </p:cSld>
+  <p:clrMapOvr>
+    <a:masterClrMapping/>
+  </p:clrMapOvr>
+</p:sld>
+</file>
+
+<file path=ppt/slides/slide6.xml><?xml version="1.0" encoding="utf-8"?>
+<p:sld xmlns:a="http://schemas.openxmlformats.org/drawingml/2006/main" xmlns:r="http://schemas.openxmlformats.org/officeDocument/2006/relationships" xmlns:p="http://schemas.openxmlformats.org/presentationml/2006/main">
+  <p:cSld>
+    <p:spTree>
+      <p:nvGrpSpPr>
+        <p:cNvPr id="1" name=""/>
+        <p:cNvGrpSpPr/>
+        <p:nvPr/>
+      </p:nvGrpSpPr>
+      <p:grpSpPr>
+        <a:xfrm>
+          <a:off x="0" y="0"/>
+          <a:ext cx="0" cy="0"/>
+          <a:chOff x="0" y="0"/>
+          <a:chExt cx="0" cy="0"/>
+        </a:xfrm>
+      </p:grpSpPr>
+      <p:sp>
+        <p:nvSpPr>
+          <p:cNvPr id="10242" name="Title 1"/>
+          <p:cNvSpPr>
+            <a:spLocks noGrp="1"/>
+          </p:cNvSpPr>
+          <p:nvPr>
+            <p:ph type="title"/>
+          </p:nvPr>
+        </p:nvSpPr>
+        <p:spPr/>
+        <p:txBody>
+          <a:bodyPr/>
+          <a:lstStyle/>
+          <a:p>
+            <a:r>
+              <a:rPr lang="en-US" altLang="en-US" dirty="0" smtClean="0"/>
+              <a:t>Contributions</a:t>
+            </a:r>
+            <a:br>
+              <a:rPr lang="en-US" altLang="en-US" dirty="0" smtClean="0"/>
+            </a:br>
+            <a:endParaRPr lang="en-US" altLang="en-US" dirty="0" smtClean="0"/>
+          </a:p>
+        </p:txBody>
+      </p:sp>
+      <p:sp>
+        <p:nvSpPr>
+          <p:cNvPr id="10243" name="Content Placeholder 2"/>
+          <p:cNvSpPr>
+            <a:spLocks noGrp="1"/>
+          </p:cNvSpPr>
+          <p:nvPr>
+            <p:ph idx="1"/>
+          </p:nvPr>
+        </p:nvSpPr>
+        <p:spPr/>
+        <p:txBody>
+          <a:bodyPr/>
+          <a:lstStyle/>
+          <a:p>
+            <a:r>
+              <a:rPr lang="en-US" altLang="en-US" sz="2400" smtClean="0"/>
+              <a:t>Framework to model and reason about the topological structure of the solutions of related plans</a:t>
+            </a:r>
+          </a:p>
+          <a:p>
+            <a:r>
+              <a:rPr lang="en-US" altLang="en-US" sz="2400" smtClean="0"/>
+              <a:t>Techniques to predict and leverage the effect of problem instance characteristics and attributes on the topological structure of the solution space</a:t>
+            </a:r>
+          </a:p>
+          <a:p>
+            <a:r>
+              <a:rPr lang="en-US" altLang="en-US" sz="2400" smtClean="0"/>
+              <a:t>Novel algorithms that exploit solution space structure to generate plan libraries, select &amp; configure algorithms, and decompose large problems</a:t>
+            </a:r>
+          </a:p>
+          <a:p>
+            <a:r>
+              <a:rPr lang="en-US" altLang="en-US" sz="2400" smtClean="0"/>
+              <a:t>Evaluation of these algorithms by comparison to competing techniques for a set of sample problems </a:t>
+            </a:r>
+          </a:p>
+        </p:txBody>
+      </p:sp>
+      <p:sp>
+        <p:nvSpPr>
+          <p:cNvPr id="10244" name="Slide Number Placeholder 3"/>
+          <p:cNvSpPr>
+            <a:spLocks noGrp="1"/>
+          </p:cNvSpPr>
+          <p:nvPr>
+            <p:ph type="sldNum" sz="quarter" idx="12"/>
+          </p:nvPr>
+        </p:nvSpPr>
+        <p:spPr>
+          <a:noFill/>
+          <a:ln/>
+          <a:extLst>
+            <a:ext uri="{909E8E84-426E-40DD-AFC4-6F175D3DCCD1}">
+              <a14:hiddenFill xmlns:a14="http://schemas.microsoft.com/office/drawing/2010/main">
+                <a:solidFill>
+                  <a:srgbClr val="FFFFFF"/>
+                </a:solidFill>
+              </a14:hiddenFill>
+            </a:ext>
+            <a:ext uri="{91240B29-F687-4F45-9708-019B960494DF}">
+              <a14:hiddenLine xmlns:a14="http://schemas.microsoft.com/office/drawing/2010/main" w="9525">
+                <a:solidFill>
+                  <a:srgbClr val="000000"/>
+                </a:solidFill>
+                <a:miter lim="800000"/>
+                <a:headEnd/>
+                <a:tailEnd/>
+              </a14:hiddenLine>
+            </a:ext>
+          </a:extLst>
+        </p:spPr>
+        <p:txBody>
+          <a:bodyPr/>
+          <a:lstStyle>
+            <a:lvl1pPr eaLnBrk="0" hangingPunct="0">
+              <a:defRPr>
+                <a:solidFill>
+                  <a:schemeClr val="tx1"/>
+                </a:solidFill>
+                <a:latin typeface="Arial" panose="020B0604020202020204" pitchFamily="34" charset="0"/>
+              </a:defRPr>
+            </a:lvl1pPr>
+            <a:lvl2pPr marL="742950" indent="-285750" eaLnBrk="0" hangingPunct="0">
+              <a:defRPr>
+                <a:solidFill>
+                  <a:schemeClr val="tx1"/>
+                </a:solidFill>
+                <a:latin typeface="Arial" panose="020B0604020202020204" pitchFamily="34" charset="0"/>
+              </a:defRPr>
+            </a:lvl2pPr>
+            <a:lvl3pPr marL="1143000" indent="-228600" eaLnBrk="0" hangingPunct="0">
+              <a:defRPr>
+                <a:solidFill>
+                  <a:schemeClr val="tx1"/>
+                </a:solidFill>
+                <a:latin typeface="Arial" panose="020B0604020202020204" pitchFamily="34" charset="0"/>
+              </a:defRPr>
+            </a:lvl3pPr>
+            <a:lvl4pPr marL="1600200" indent="-228600" eaLnBrk="0" hangingPunct="0">
+              <a:defRPr>
+                <a:solidFill>
+                  <a:schemeClr val="tx1"/>
+                </a:solidFill>
+                <a:latin typeface="Arial" panose="020B0604020202020204" pitchFamily="34" charset="0"/>
+              </a:defRPr>
+            </a:lvl4pPr>
+            <a:lvl5pPr marL="2057400" indent="-228600" eaLnBrk="0" hangingPunct="0">
+              <a:defRPr>
+                <a:solidFill>
+                  <a:schemeClr val="tx1"/>
+                </a:solidFill>
+                <a:latin typeface="Arial" panose="020B0604020202020204" pitchFamily="34" charset="0"/>
+              </a:defRPr>
+            </a:lvl5pPr>
+            <a:lvl6pPr marL="2514600" indent="-228600" eaLnBrk="0" fontAlgn="base" hangingPunct="0">
+              <a:spcBef>
+                <a:spcPct val="0"/>
+              </a:spcBef>
+              <a:spcAft>
+                <a:spcPct val="0"/>
+              </a:spcAft>
+              <a:defRPr>
+                <a:solidFill>
+                  <a:schemeClr val="tx1"/>
+                </a:solidFill>
+                <a:latin typeface="Arial" panose="020B0604020202020204" pitchFamily="34" charset="0"/>
+              </a:defRPr>
+            </a:lvl6pPr>
+            <a:lvl7pPr marL="2971800" indent="-228600" eaLnBrk="0" fontAlgn="base" hangingPunct="0">
+              <a:spcBef>
+                <a:spcPct val="0"/>
+              </a:spcBef>
+              <a:spcAft>
+                <a:spcPct val="0"/>
+              </a:spcAft>
+              <a:defRPr>
+                <a:solidFill>
+                  <a:schemeClr val="tx1"/>
+                </a:solidFill>
+                <a:latin typeface="Arial" panose="020B0604020202020204" pitchFamily="34" charset="0"/>
+              </a:defRPr>
+            </a:lvl7pPr>
+            <a:lvl8pPr marL="3429000" indent="-228600" eaLnBrk="0" fontAlgn="base" hangingPunct="0">
+              <a:spcBef>
+                <a:spcPct val="0"/>
+              </a:spcBef>
+              <a:spcAft>
+                <a:spcPct val="0"/>
+              </a:spcAft>
+              <a:defRPr>
+                <a:solidFill>
+                  <a:schemeClr val="tx1"/>
+                </a:solidFill>
+                <a:latin typeface="Arial" panose="020B0604020202020204" pitchFamily="34" charset="0"/>
+              </a:defRPr>
+            </a:lvl8pPr>
+            <a:lvl9pPr marL="3886200" indent="-228600" eaLnBrk="0" fontAlgn="base" hangingPunct="0">
+              <a:spcBef>
+                <a:spcPct val="0"/>
+              </a:spcBef>
+              <a:spcAft>
+                <a:spcPct val="0"/>
+              </a:spcAft>
+              <a:defRPr>
+                <a:solidFill>
+                  <a:schemeClr val="tx1"/>
+                </a:solidFill>
+                <a:latin typeface="Arial" panose="020B0604020202020204" pitchFamily="34" charset="0"/>
+              </a:defRPr>
+            </a:lvl9pPr>
+          </a:lstStyle>
+          <a:p>
+            <a:pPr eaLnBrk="1" hangingPunct="1"/>
+            <a:fld id="{61CC1C98-F26B-4DC2-9723-37E41C5A272D}" type="slidenum">
+              <a:rPr lang="en-US" altLang="en-US"/>
+              <a:pPr eaLnBrk="1" hangingPunct="1"/>
+              <a:t>6</a:t>
+            </a:fld>
+            <a:endParaRPr lang="en-US" altLang="en-US"/>
+          </a:p>
+        </p:txBody>
+      </p:sp>
+    </p:spTree>
+  </p:cSld>
+  <p:clrMapOvr>
+    <a:masterClrMapping/>
+  </p:clrMapOvr>
+  <p:timing>
+    <p:tnLst>
+      <p:par>
+        <p:cTn id="1" dur="indefinite" restart="never" nodeType="tmRoot"/>
+      </p:par>
+    </p:tnLst>
+  </p:timing>
+</p:sld>
+</file>
+
+<file path=ppt/slides/slide60.xml><?xml version="1.0" encoding="utf-8"?>
+<p:sld xmlns:a="http://schemas.openxmlformats.org/drawingml/2006/main" xmlns:r="http://schemas.openxmlformats.org/officeDocument/2006/relationships" xmlns:p="http://schemas.openxmlformats.org/presentationml/2006/main">
+  <p:cSld>
+    <p:spTree>
+      <p:nvGrpSpPr>
+        <p:cNvPr id="1" name=""/>
+        <p:cNvGrpSpPr/>
+        <p:nvPr/>
+      </p:nvGrpSpPr>
+      <p:grpSpPr>
+        <a:xfrm>
+          <a:off x="0" y="0"/>
+          <a:ext cx="0" cy="0"/>
+          <a:chOff x="0" y="0"/>
+          <a:chExt cx="0" cy="0"/>
+        </a:xfrm>
+      </p:grpSpPr>
+      <p:sp>
+        <p:nvSpPr>
           <p:cNvPr id="61442" name="Slide Number Placeholder 5"/>
           <p:cNvSpPr>
             <a:spLocks noGrp="1"/>
@@ -46936,7 +47750,7 @@
             <a:fld id="{273AC17D-DE86-476D-BA08-C3F0D10113EB}" type="slidenum">
               <a:rPr lang="en-US" altLang="en-US"/>
               <a:pPr eaLnBrk="1" hangingPunct="1"/>
-              <a:t>56</a:t>
+              <a:t>60</a:t>
             </a:fld>
             <a:endParaRPr lang="en-US" altLang="en-US"/>
           </a:p>
@@ -47214,1228 +48028,6 @@
 </p:sld>
 </file>
 
-<file path=ppt/slides/slide57.xml><?xml version="1.0" encoding="utf-8"?>
-<p:sld xmlns:a="http://schemas.openxmlformats.org/drawingml/2006/main" xmlns:r="http://schemas.openxmlformats.org/officeDocument/2006/relationships" xmlns:p="http://schemas.openxmlformats.org/presentationml/2006/main">
-  <p:cSld>
-    <p:spTree>
-      <p:nvGrpSpPr>
-        <p:cNvPr id="1" name=""/>
-        <p:cNvGrpSpPr/>
-        <p:nvPr/>
-      </p:nvGrpSpPr>
-      <p:grpSpPr>
-        <a:xfrm>
-          <a:off x="0" y="0"/>
-          <a:ext cx="0" cy="0"/>
-          <a:chOff x="0" y="0"/>
-          <a:chExt cx="0" cy="0"/>
-        </a:xfrm>
-      </p:grpSpPr>
-      <p:sp>
-        <p:nvSpPr>
-          <p:cNvPr id="62466" name="Title 1"/>
-          <p:cNvSpPr>
-            <a:spLocks noGrp="1"/>
-          </p:cNvSpPr>
-          <p:nvPr>
-            <p:ph type="title"/>
-          </p:nvPr>
-        </p:nvSpPr>
-        <p:spPr/>
-        <p:txBody>
-          <a:bodyPr/>
-          <a:lstStyle/>
-          <a:p>
-            <a:r>
-              <a:rPr lang="en-US" altLang="en-US" smtClean="0"/>
-              <a:t>Backup</a:t>
-            </a:r>
-            <a:br>
-              <a:rPr lang="en-US" altLang="en-US" smtClean="0"/>
-            </a:br>
-            <a:endParaRPr lang="en-US" altLang="en-US" smtClean="0"/>
-          </a:p>
-        </p:txBody>
-      </p:sp>
-      <p:sp>
-        <p:nvSpPr>
-          <p:cNvPr id="62467" name="Content Placeholder 2"/>
-          <p:cNvSpPr>
-            <a:spLocks noGrp="1"/>
-          </p:cNvSpPr>
-          <p:nvPr>
-            <p:ph idx="1"/>
-          </p:nvPr>
-        </p:nvSpPr>
-        <p:spPr/>
-        <p:txBody>
-          <a:bodyPr/>
-          <a:lstStyle/>
-          <a:p>
-            <a:endParaRPr lang="en-US" altLang="en-US" smtClean="0"/>
-          </a:p>
-        </p:txBody>
-      </p:sp>
-      <p:sp>
-        <p:nvSpPr>
-          <p:cNvPr id="62468" name="Slide Number Placeholder 3"/>
-          <p:cNvSpPr>
-            <a:spLocks noGrp="1"/>
-          </p:cNvSpPr>
-          <p:nvPr>
-            <p:ph type="sldNum" sz="quarter" idx="12"/>
-          </p:nvPr>
-        </p:nvSpPr>
-        <p:spPr>
-          <a:noFill/>
-          <a:ln/>
-          <a:extLst>
-            <a:ext uri="{909E8E84-426E-40DD-AFC4-6F175D3DCCD1}">
-              <a14:hiddenFill xmlns:a14="http://schemas.microsoft.com/office/drawing/2010/main">
-                <a:solidFill>
-                  <a:srgbClr val="FFFFFF"/>
-                </a:solidFill>
-              </a14:hiddenFill>
-            </a:ext>
-            <a:ext uri="{91240B29-F687-4F45-9708-019B960494DF}">
-              <a14:hiddenLine xmlns:a14="http://schemas.microsoft.com/office/drawing/2010/main" w="9525">
-                <a:solidFill>
-                  <a:srgbClr val="000000"/>
-                </a:solidFill>
-                <a:miter lim="800000"/>
-                <a:headEnd/>
-                <a:tailEnd/>
-              </a14:hiddenLine>
-            </a:ext>
-          </a:extLst>
-        </p:spPr>
-        <p:txBody>
-          <a:bodyPr/>
-          <a:lstStyle>
-            <a:lvl1pPr eaLnBrk="0" hangingPunct="0">
-              <a:defRPr>
-                <a:solidFill>
-                  <a:schemeClr val="tx1"/>
-                </a:solidFill>
-                <a:latin typeface="Arial" panose="020B0604020202020204" pitchFamily="34" charset="0"/>
-              </a:defRPr>
-            </a:lvl1pPr>
-            <a:lvl2pPr marL="742950" indent="-285750" eaLnBrk="0" hangingPunct="0">
-              <a:defRPr>
-                <a:solidFill>
-                  <a:schemeClr val="tx1"/>
-                </a:solidFill>
-                <a:latin typeface="Arial" panose="020B0604020202020204" pitchFamily="34" charset="0"/>
-              </a:defRPr>
-            </a:lvl2pPr>
-            <a:lvl3pPr marL="1143000" indent="-228600" eaLnBrk="0" hangingPunct="0">
-              <a:defRPr>
-                <a:solidFill>
-                  <a:schemeClr val="tx1"/>
-                </a:solidFill>
-                <a:latin typeface="Arial" panose="020B0604020202020204" pitchFamily="34" charset="0"/>
-              </a:defRPr>
-            </a:lvl3pPr>
-            <a:lvl4pPr marL="1600200" indent="-228600" eaLnBrk="0" hangingPunct="0">
-              <a:defRPr>
-                <a:solidFill>
-                  <a:schemeClr val="tx1"/>
-                </a:solidFill>
-                <a:latin typeface="Arial" panose="020B0604020202020204" pitchFamily="34" charset="0"/>
-              </a:defRPr>
-            </a:lvl4pPr>
-            <a:lvl5pPr marL="2057400" indent="-228600" eaLnBrk="0" hangingPunct="0">
-              <a:defRPr>
-                <a:solidFill>
-                  <a:schemeClr val="tx1"/>
-                </a:solidFill>
-                <a:latin typeface="Arial" panose="020B0604020202020204" pitchFamily="34" charset="0"/>
-              </a:defRPr>
-            </a:lvl5pPr>
-            <a:lvl6pPr marL="2514600" indent="-228600" eaLnBrk="0" fontAlgn="base" hangingPunct="0">
-              <a:spcBef>
-                <a:spcPct val="0"/>
-              </a:spcBef>
-              <a:spcAft>
-                <a:spcPct val="0"/>
-              </a:spcAft>
-              <a:defRPr>
-                <a:solidFill>
-                  <a:schemeClr val="tx1"/>
-                </a:solidFill>
-                <a:latin typeface="Arial" panose="020B0604020202020204" pitchFamily="34" charset="0"/>
-              </a:defRPr>
-            </a:lvl6pPr>
-            <a:lvl7pPr marL="2971800" indent="-228600" eaLnBrk="0" fontAlgn="base" hangingPunct="0">
-              <a:spcBef>
-                <a:spcPct val="0"/>
-              </a:spcBef>
-              <a:spcAft>
-                <a:spcPct val="0"/>
-              </a:spcAft>
-              <a:defRPr>
-                <a:solidFill>
-                  <a:schemeClr val="tx1"/>
-                </a:solidFill>
-                <a:latin typeface="Arial" panose="020B0604020202020204" pitchFamily="34" charset="0"/>
-              </a:defRPr>
-            </a:lvl7pPr>
-            <a:lvl8pPr marL="3429000" indent="-228600" eaLnBrk="0" fontAlgn="base" hangingPunct="0">
-              <a:spcBef>
-                <a:spcPct val="0"/>
-              </a:spcBef>
-              <a:spcAft>
-                <a:spcPct val="0"/>
-              </a:spcAft>
-              <a:defRPr>
-                <a:solidFill>
-                  <a:schemeClr val="tx1"/>
-                </a:solidFill>
-                <a:latin typeface="Arial" panose="020B0604020202020204" pitchFamily="34" charset="0"/>
-              </a:defRPr>
-            </a:lvl8pPr>
-            <a:lvl9pPr marL="3886200" indent="-228600" eaLnBrk="0" fontAlgn="base" hangingPunct="0">
-              <a:spcBef>
-                <a:spcPct val="0"/>
-              </a:spcBef>
-              <a:spcAft>
-                <a:spcPct val="0"/>
-              </a:spcAft>
-              <a:defRPr>
-                <a:solidFill>
-                  <a:schemeClr val="tx1"/>
-                </a:solidFill>
-                <a:latin typeface="Arial" panose="020B0604020202020204" pitchFamily="34" charset="0"/>
-              </a:defRPr>
-            </a:lvl9pPr>
-          </a:lstStyle>
-          <a:p>
-            <a:pPr eaLnBrk="1" hangingPunct="1"/>
-            <a:fld id="{072BC278-562D-4543-9C02-5D9B4D62CA1B}" type="slidenum">
-              <a:rPr lang="en-US" altLang="en-US"/>
-              <a:pPr eaLnBrk="1" hangingPunct="1"/>
-              <a:t>57</a:t>
-            </a:fld>
-            <a:endParaRPr lang="en-US" altLang="en-US"/>
-          </a:p>
-        </p:txBody>
-      </p:sp>
-    </p:spTree>
-  </p:cSld>
-  <p:clrMapOvr>
-    <a:masterClrMapping/>
-  </p:clrMapOvr>
-  <p:timing>
-    <p:tnLst>
-      <p:par>
-        <p:cTn id="1" dur="indefinite" restart="never" nodeType="tmRoot"/>
-      </p:par>
-    </p:tnLst>
-  </p:timing>
-</p:sld>
-</file>
-
-<file path=ppt/slides/slide58.xml><?xml version="1.0" encoding="utf-8"?>
-<p:sld xmlns:a="http://schemas.openxmlformats.org/drawingml/2006/main" xmlns:r="http://schemas.openxmlformats.org/officeDocument/2006/relationships" xmlns:p="http://schemas.openxmlformats.org/presentationml/2006/main">
-  <p:cSld>
-    <p:spTree>
-      <p:nvGrpSpPr>
-        <p:cNvPr id="1" name=""/>
-        <p:cNvGrpSpPr/>
-        <p:nvPr/>
-      </p:nvGrpSpPr>
-      <p:grpSpPr>
-        <a:xfrm>
-          <a:off x="0" y="0"/>
-          <a:ext cx="0" cy="0"/>
-          <a:chOff x="0" y="0"/>
-          <a:chExt cx="0" cy="0"/>
-        </a:xfrm>
-      </p:grpSpPr>
-      <p:sp>
-        <p:nvSpPr>
-          <p:cNvPr id="55298" name="Title 1"/>
-          <p:cNvSpPr>
-            <a:spLocks noGrp="1"/>
-          </p:cNvSpPr>
-          <p:nvPr>
-            <p:ph type="title"/>
-          </p:nvPr>
-        </p:nvSpPr>
-        <p:spPr/>
-        <p:txBody>
-          <a:bodyPr/>
-          <a:lstStyle/>
-          <a:p>
-            <a:r>
-              <a:rPr lang="en-US" altLang="en-US" dirty="0" smtClean="0"/>
-              <a:t>Research Plan Goals</a:t>
-            </a:r>
-            <a:br>
-              <a:rPr lang="en-US" altLang="en-US" dirty="0" smtClean="0"/>
-            </a:br>
-            <a:endParaRPr lang="en-US" altLang="en-US" dirty="0" smtClean="0"/>
-          </a:p>
-        </p:txBody>
-      </p:sp>
-      <p:sp>
-        <p:nvSpPr>
-          <p:cNvPr id="55299" name="Content Placeholder 2"/>
-          <p:cNvSpPr>
-            <a:spLocks noGrp="1"/>
-          </p:cNvSpPr>
-          <p:nvPr>
-            <p:ph idx="1"/>
-          </p:nvPr>
-        </p:nvSpPr>
-        <p:spPr/>
-        <p:txBody>
-          <a:bodyPr/>
-          <a:lstStyle/>
-          <a:p>
-            <a:r>
-              <a:rPr lang="en-US" altLang="en-US" sz="2400" smtClean="0"/>
-              <a:t>Investigate inferring a problem space analysis and solution topology from a sample set of problem instance and solution pairs</a:t>
-            </a:r>
-          </a:p>
-          <a:p>
-            <a:r>
-              <a:rPr lang="en-US" altLang="en-US" sz="2400" smtClean="0"/>
-              <a:t>Apply problem space analysis and other domain characteristics to the creation of an efficient plan library</a:t>
-            </a:r>
-          </a:p>
-          <a:p>
-            <a:r>
-              <a:rPr lang="en-US" altLang="en-US" sz="2400" smtClean="0"/>
-              <a:t>Apply problem space analysis to the selection of algorithms suited for a particular region of the problem space</a:t>
-            </a:r>
-          </a:p>
-          <a:p>
-            <a:r>
-              <a:rPr lang="en-US" altLang="en-US" sz="2400" smtClean="0"/>
-              <a:t>Apply problem space analysis to strategic decomposition of large planning problems</a:t>
-            </a:r>
-          </a:p>
-        </p:txBody>
-      </p:sp>
-      <p:sp>
-        <p:nvSpPr>
-          <p:cNvPr id="55300" name="Slide Number Placeholder 3"/>
-          <p:cNvSpPr>
-            <a:spLocks noGrp="1"/>
-          </p:cNvSpPr>
-          <p:nvPr>
-            <p:ph type="sldNum" sz="quarter" idx="12"/>
-          </p:nvPr>
-        </p:nvSpPr>
-        <p:spPr>
-          <a:noFill/>
-          <a:ln/>
-          <a:extLst>
-            <a:ext uri="{909E8E84-426E-40DD-AFC4-6F175D3DCCD1}">
-              <a14:hiddenFill xmlns:a14="http://schemas.microsoft.com/office/drawing/2010/main">
-                <a:solidFill>
-                  <a:srgbClr val="FFFFFF"/>
-                </a:solidFill>
-              </a14:hiddenFill>
-            </a:ext>
-            <a:ext uri="{91240B29-F687-4F45-9708-019B960494DF}">
-              <a14:hiddenLine xmlns:a14="http://schemas.microsoft.com/office/drawing/2010/main" w="9525">
-                <a:solidFill>
-                  <a:srgbClr val="000000"/>
-                </a:solidFill>
-                <a:miter lim="800000"/>
-                <a:headEnd/>
-                <a:tailEnd/>
-              </a14:hiddenLine>
-            </a:ext>
-          </a:extLst>
-        </p:spPr>
-        <p:txBody>
-          <a:bodyPr/>
-          <a:lstStyle>
-            <a:lvl1pPr eaLnBrk="0" hangingPunct="0">
-              <a:defRPr>
-                <a:solidFill>
-                  <a:schemeClr val="tx1"/>
-                </a:solidFill>
-                <a:latin typeface="Arial" panose="020B0604020202020204" pitchFamily="34" charset="0"/>
-              </a:defRPr>
-            </a:lvl1pPr>
-            <a:lvl2pPr marL="742950" indent="-285750" eaLnBrk="0" hangingPunct="0">
-              <a:defRPr>
-                <a:solidFill>
-                  <a:schemeClr val="tx1"/>
-                </a:solidFill>
-                <a:latin typeface="Arial" panose="020B0604020202020204" pitchFamily="34" charset="0"/>
-              </a:defRPr>
-            </a:lvl2pPr>
-            <a:lvl3pPr marL="1143000" indent="-228600" eaLnBrk="0" hangingPunct="0">
-              <a:defRPr>
-                <a:solidFill>
-                  <a:schemeClr val="tx1"/>
-                </a:solidFill>
-                <a:latin typeface="Arial" panose="020B0604020202020204" pitchFamily="34" charset="0"/>
-              </a:defRPr>
-            </a:lvl3pPr>
-            <a:lvl4pPr marL="1600200" indent="-228600" eaLnBrk="0" hangingPunct="0">
-              <a:defRPr>
-                <a:solidFill>
-                  <a:schemeClr val="tx1"/>
-                </a:solidFill>
-                <a:latin typeface="Arial" panose="020B0604020202020204" pitchFamily="34" charset="0"/>
-              </a:defRPr>
-            </a:lvl4pPr>
-            <a:lvl5pPr marL="2057400" indent="-228600" eaLnBrk="0" hangingPunct="0">
-              <a:defRPr>
-                <a:solidFill>
-                  <a:schemeClr val="tx1"/>
-                </a:solidFill>
-                <a:latin typeface="Arial" panose="020B0604020202020204" pitchFamily="34" charset="0"/>
-              </a:defRPr>
-            </a:lvl5pPr>
-            <a:lvl6pPr marL="2514600" indent="-228600" eaLnBrk="0" fontAlgn="base" hangingPunct="0">
-              <a:spcBef>
-                <a:spcPct val="0"/>
-              </a:spcBef>
-              <a:spcAft>
-                <a:spcPct val="0"/>
-              </a:spcAft>
-              <a:defRPr>
-                <a:solidFill>
-                  <a:schemeClr val="tx1"/>
-                </a:solidFill>
-                <a:latin typeface="Arial" panose="020B0604020202020204" pitchFamily="34" charset="0"/>
-              </a:defRPr>
-            </a:lvl6pPr>
-            <a:lvl7pPr marL="2971800" indent="-228600" eaLnBrk="0" fontAlgn="base" hangingPunct="0">
-              <a:spcBef>
-                <a:spcPct val="0"/>
-              </a:spcBef>
-              <a:spcAft>
-                <a:spcPct val="0"/>
-              </a:spcAft>
-              <a:defRPr>
-                <a:solidFill>
-                  <a:schemeClr val="tx1"/>
-                </a:solidFill>
-                <a:latin typeface="Arial" panose="020B0604020202020204" pitchFamily="34" charset="0"/>
-              </a:defRPr>
-            </a:lvl7pPr>
-            <a:lvl8pPr marL="3429000" indent="-228600" eaLnBrk="0" fontAlgn="base" hangingPunct="0">
-              <a:spcBef>
-                <a:spcPct val="0"/>
-              </a:spcBef>
-              <a:spcAft>
-                <a:spcPct val="0"/>
-              </a:spcAft>
-              <a:defRPr>
-                <a:solidFill>
-                  <a:schemeClr val="tx1"/>
-                </a:solidFill>
-                <a:latin typeface="Arial" panose="020B0604020202020204" pitchFamily="34" charset="0"/>
-              </a:defRPr>
-            </a:lvl8pPr>
-            <a:lvl9pPr marL="3886200" indent="-228600" eaLnBrk="0" fontAlgn="base" hangingPunct="0">
-              <a:spcBef>
-                <a:spcPct val="0"/>
-              </a:spcBef>
-              <a:spcAft>
-                <a:spcPct val="0"/>
-              </a:spcAft>
-              <a:defRPr>
-                <a:solidFill>
-                  <a:schemeClr val="tx1"/>
-                </a:solidFill>
-                <a:latin typeface="Arial" panose="020B0604020202020204" pitchFamily="34" charset="0"/>
-              </a:defRPr>
-            </a:lvl9pPr>
-          </a:lstStyle>
-          <a:p>
-            <a:pPr eaLnBrk="1" hangingPunct="1"/>
-            <a:fld id="{AA89C6D4-039B-4EF3-8C72-8A9E41922F60}" type="slidenum">
-              <a:rPr lang="en-US" altLang="en-US"/>
-              <a:pPr eaLnBrk="1" hangingPunct="1"/>
-              <a:t>58</a:t>
-            </a:fld>
-            <a:endParaRPr lang="en-US" altLang="en-US"/>
-          </a:p>
-        </p:txBody>
-      </p:sp>
-    </p:spTree>
-  </p:cSld>
-  <p:clrMapOvr>
-    <a:masterClrMapping/>
-  </p:clrMapOvr>
-  <p:timing>
-    <p:tnLst>
-      <p:par>
-        <p:cTn id="1" dur="indefinite" restart="never" nodeType="tmRoot"/>
-      </p:par>
-    </p:tnLst>
-  </p:timing>
-</p:sld>
-</file>
-
-<file path=ppt/slides/slide59.xml><?xml version="1.0" encoding="utf-8"?>
-<p:sld xmlns:a="http://schemas.openxmlformats.org/drawingml/2006/main" xmlns:r="http://schemas.openxmlformats.org/officeDocument/2006/relationships" xmlns:p="http://schemas.openxmlformats.org/presentationml/2006/main">
-  <p:cSld>
-    <p:spTree>
-      <p:nvGrpSpPr>
-        <p:cNvPr id="1" name=""/>
-        <p:cNvGrpSpPr/>
-        <p:nvPr/>
-      </p:nvGrpSpPr>
-      <p:grpSpPr>
-        <a:xfrm>
-          <a:off x="0" y="0"/>
-          <a:ext cx="0" cy="0"/>
-          <a:chOff x="0" y="0"/>
-          <a:chExt cx="0" cy="0"/>
-        </a:xfrm>
-      </p:grpSpPr>
-      <p:sp>
-        <p:nvSpPr>
-          <p:cNvPr id="58370" name="Title 1"/>
-          <p:cNvSpPr>
-            <a:spLocks noGrp="1"/>
-          </p:cNvSpPr>
-          <p:nvPr>
-            <p:ph type="title"/>
-          </p:nvPr>
-        </p:nvSpPr>
-        <p:spPr/>
-        <p:txBody>
-          <a:bodyPr/>
-          <a:lstStyle/>
-          <a:p>
-            <a:r>
-              <a:rPr lang="en-US" altLang="en-US" dirty="0" smtClean="0"/>
-              <a:t>Contributions</a:t>
-            </a:r>
-            <a:br>
-              <a:rPr lang="en-US" altLang="en-US" dirty="0" smtClean="0"/>
-            </a:br>
-            <a:endParaRPr lang="en-US" altLang="en-US" dirty="0" smtClean="0"/>
-          </a:p>
-        </p:txBody>
-      </p:sp>
-      <p:sp>
-        <p:nvSpPr>
-          <p:cNvPr id="58371" name="Content Placeholder 2"/>
-          <p:cNvSpPr>
-            <a:spLocks noGrp="1"/>
-          </p:cNvSpPr>
-          <p:nvPr>
-            <p:ph idx="1"/>
-          </p:nvPr>
-        </p:nvSpPr>
-        <p:spPr/>
-        <p:txBody>
-          <a:bodyPr/>
-          <a:lstStyle/>
-          <a:p>
-            <a:r>
-              <a:rPr lang="en-US" altLang="en-US" sz="2400" smtClean="0"/>
-              <a:t>Framework to model and reason about the topological structure of the solutions of related plans</a:t>
-            </a:r>
-          </a:p>
-          <a:p>
-            <a:r>
-              <a:rPr lang="en-US" altLang="en-US" sz="2400" smtClean="0"/>
-              <a:t>Techniques to predict and leverage the effect of problem instance characteristics and attributes on the topological structure of the solution space</a:t>
-            </a:r>
-          </a:p>
-          <a:p>
-            <a:r>
-              <a:rPr lang="en-US" altLang="en-US" sz="2400" smtClean="0"/>
-              <a:t>Novel algorithms that exploit solution space structure to generate plan libraries, select &amp; configure algorithms, and decompose large problems</a:t>
-            </a:r>
-          </a:p>
-          <a:p>
-            <a:r>
-              <a:rPr lang="en-US" altLang="en-US" sz="2400" smtClean="0"/>
-              <a:t>Evaluation of these algorithms on a sample problems by comparison to competing techniques</a:t>
-            </a:r>
-          </a:p>
-        </p:txBody>
-      </p:sp>
-      <p:sp>
-        <p:nvSpPr>
-          <p:cNvPr id="58372" name="Slide Number Placeholder 3"/>
-          <p:cNvSpPr>
-            <a:spLocks noGrp="1"/>
-          </p:cNvSpPr>
-          <p:nvPr>
-            <p:ph type="sldNum" sz="quarter" idx="12"/>
-          </p:nvPr>
-        </p:nvSpPr>
-        <p:spPr>
-          <a:noFill/>
-          <a:ln/>
-          <a:extLst>
-            <a:ext uri="{909E8E84-426E-40DD-AFC4-6F175D3DCCD1}">
-              <a14:hiddenFill xmlns:a14="http://schemas.microsoft.com/office/drawing/2010/main">
-                <a:solidFill>
-                  <a:srgbClr val="FFFFFF"/>
-                </a:solidFill>
-              </a14:hiddenFill>
-            </a:ext>
-            <a:ext uri="{91240B29-F687-4F45-9708-019B960494DF}">
-              <a14:hiddenLine xmlns:a14="http://schemas.microsoft.com/office/drawing/2010/main" w="9525">
-                <a:solidFill>
-                  <a:srgbClr val="000000"/>
-                </a:solidFill>
-                <a:miter lim="800000"/>
-                <a:headEnd/>
-                <a:tailEnd/>
-              </a14:hiddenLine>
-            </a:ext>
-          </a:extLst>
-        </p:spPr>
-        <p:txBody>
-          <a:bodyPr/>
-          <a:lstStyle>
-            <a:lvl1pPr eaLnBrk="0" hangingPunct="0">
-              <a:defRPr>
-                <a:solidFill>
-                  <a:schemeClr val="tx1"/>
-                </a:solidFill>
-                <a:latin typeface="Arial" panose="020B0604020202020204" pitchFamily="34" charset="0"/>
-              </a:defRPr>
-            </a:lvl1pPr>
-            <a:lvl2pPr marL="742950" indent="-285750" eaLnBrk="0" hangingPunct="0">
-              <a:defRPr>
-                <a:solidFill>
-                  <a:schemeClr val="tx1"/>
-                </a:solidFill>
-                <a:latin typeface="Arial" panose="020B0604020202020204" pitchFamily="34" charset="0"/>
-              </a:defRPr>
-            </a:lvl2pPr>
-            <a:lvl3pPr marL="1143000" indent="-228600" eaLnBrk="0" hangingPunct="0">
-              <a:defRPr>
-                <a:solidFill>
-                  <a:schemeClr val="tx1"/>
-                </a:solidFill>
-                <a:latin typeface="Arial" panose="020B0604020202020204" pitchFamily="34" charset="0"/>
-              </a:defRPr>
-            </a:lvl3pPr>
-            <a:lvl4pPr marL="1600200" indent="-228600" eaLnBrk="0" hangingPunct="0">
-              <a:defRPr>
-                <a:solidFill>
-                  <a:schemeClr val="tx1"/>
-                </a:solidFill>
-                <a:latin typeface="Arial" panose="020B0604020202020204" pitchFamily="34" charset="0"/>
-              </a:defRPr>
-            </a:lvl4pPr>
-            <a:lvl5pPr marL="2057400" indent="-228600" eaLnBrk="0" hangingPunct="0">
-              <a:defRPr>
-                <a:solidFill>
-                  <a:schemeClr val="tx1"/>
-                </a:solidFill>
-                <a:latin typeface="Arial" panose="020B0604020202020204" pitchFamily="34" charset="0"/>
-              </a:defRPr>
-            </a:lvl5pPr>
-            <a:lvl6pPr marL="2514600" indent="-228600" eaLnBrk="0" fontAlgn="base" hangingPunct="0">
-              <a:spcBef>
-                <a:spcPct val="0"/>
-              </a:spcBef>
-              <a:spcAft>
-                <a:spcPct val="0"/>
-              </a:spcAft>
-              <a:defRPr>
-                <a:solidFill>
-                  <a:schemeClr val="tx1"/>
-                </a:solidFill>
-                <a:latin typeface="Arial" panose="020B0604020202020204" pitchFamily="34" charset="0"/>
-              </a:defRPr>
-            </a:lvl6pPr>
-            <a:lvl7pPr marL="2971800" indent="-228600" eaLnBrk="0" fontAlgn="base" hangingPunct="0">
-              <a:spcBef>
-                <a:spcPct val="0"/>
-              </a:spcBef>
-              <a:spcAft>
-                <a:spcPct val="0"/>
-              </a:spcAft>
-              <a:defRPr>
-                <a:solidFill>
-                  <a:schemeClr val="tx1"/>
-                </a:solidFill>
-                <a:latin typeface="Arial" panose="020B0604020202020204" pitchFamily="34" charset="0"/>
-              </a:defRPr>
-            </a:lvl7pPr>
-            <a:lvl8pPr marL="3429000" indent="-228600" eaLnBrk="0" fontAlgn="base" hangingPunct="0">
-              <a:spcBef>
-                <a:spcPct val="0"/>
-              </a:spcBef>
-              <a:spcAft>
-                <a:spcPct val="0"/>
-              </a:spcAft>
-              <a:defRPr>
-                <a:solidFill>
-                  <a:schemeClr val="tx1"/>
-                </a:solidFill>
-                <a:latin typeface="Arial" panose="020B0604020202020204" pitchFamily="34" charset="0"/>
-              </a:defRPr>
-            </a:lvl8pPr>
-            <a:lvl9pPr marL="3886200" indent="-228600" eaLnBrk="0" fontAlgn="base" hangingPunct="0">
-              <a:spcBef>
-                <a:spcPct val="0"/>
-              </a:spcBef>
-              <a:spcAft>
-                <a:spcPct val="0"/>
-              </a:spcAft>
-              <a:defRPr>
-                <a:solidFill>
-                  <a:schemeClr val="tx1"/>
-                </a:solidFill>
-                <a:latin typeface="Arial" panose="020B0604020202020204" pitchFamily="34" charset="0"/>
-              </a:defRPr>
-            </a:lvl9pPr>
-          </a:lstStyle>
-          <a:p>
-            <a:pPr eaLnBrk="1" hangingPunct="1"/>
-            <a:fld id="{583A6B54-2945-49C3-920D-BEE8A5CA810C}" type="slidenum">
-              <a:rPr lang="en-US" altLang="en-US"/>
-              <a:pPr eaLnBrk="1" hangingPunct="1"/>
-              <a:t>59</a:t>
-            </a:fld>
-            <a:endParaRPr lang="en-US" altLang="en-US"/>
-          </a:p>
-        </p:txBody>
-      </p:sp>
-    </p:spTree>
-  </p:cSld>
-  <p:clrMapOvr>
-    <a:masterClrMapping/>
-  </p:clrMapOvr>
-  <p:timing>
-    <p:tnLst>
-      <p:par>
-        <p:cTn id="1" dur="indefinite" restart="never" nodeType="tmRoot"/>
-      </p:par>
-    </p:tnLst>
-  </p:timing>
-</p:sld>
-</file>
-
-<file path=ppt/slides/slide6.xml><?xml version="1.0" encoding="utf-8"?>
-<p:sld xmlns:a="http://schemas.openxmlformats.org/drawingml/2006/main" xmlns:r="http://schemas.openxmlformats.org/officeDocument/2006/relationships" xmlns:p="http://schemas.openxmlformats.org/presentationml/2006/main">
-  <p:cSld>
-    <p:spTree>
-      <p:nvGrpSpPr>
-        <p:cNvPr id="1" name=""/>
-        <p:cNvGrpSpPr/>
-        <p:nvPr/>
-      </p:nvGrpSpPr>
-      <p:grpSpPr>
-        <a:xfrm>
-          <a:off x="0" y="0"/>
-          <a:ext cx="0" cy="0"/>
-          <a:chOff x="0" y="0"/>
-          <a:chExt cx="0" cy="0"/>
-        </a:xfrm>
-      </p:grpSpPr>
-      <p:sp>
-        <p:nvSpPr>
-          <p:cNvPr id="10242" name="Title 1"/>
-          <p:cNvSpPr>
-            <a:spLocks noGrp="1"/>
-          </p:cNvSpPr>
-          <p:nvPr>
-            <p:ph type="title"/>
-          </p:nvPr>
-        </p:nvSpPr>
-        <p:spPr/>
-        <p:txBody>
-          <a:bodyPr/>
-          <a:lstStyle/>
-          <a:p>
-            <a:r>
-              <a:rPr lang="en-US" altLang="en-US" dirty="0" smtClean="0"/>
-              <a:t>Contributions</a:t>
-            </a:r>
-            <a:br>
-              <a:rPr lang="en-US" altLang="en-US" dirty="0" smtClean="0"/>
-            </a:br>
-            <a:endParaRPr lang="en-US" altLang="en-US" dirty="0" smtClean="0"/>
-          </a:p>
-        </p:txBody>
-      </p:sp>
-      <p:sp>
-        <p:nvSpPr>
-          <p:cNvPr id="10243" name="Content Placeholder 2"/>
-          <p:cNvSpPr>
-            <a:spLocks noGrp="1"/>
-          </p:cNvSpPr>
-          <p:nvPr>
-            <p:ph idx="1"/>
-          </p:nvPr>
-        </p:nvSpPr>
-        <p:spPr/>
-        <p:txBody>
-          <a:bodyPr/>
-          <a:lstStyle/>
-          <a:p>
-            <a:r>
-              <a:rPr lang="en-US" altLang="en-US" sz="2400" smtClean="0"/>
-              <a:t>Framework to model and reason about the topological structure of the solutions of related plans</a:t>
-            </a:r>
-          </a:p>
-          <a:p>
-            <a:r>
-              <a:rPr lang="en-US" altLang="en-US" sz="2400" smtClean="0"/>
-              <a:t>Techniques to predict and leverage the effect of problem instance characteristics and attributes on the topological structure of the solution space</a:t>
-            </a:r>
-          </a:p>
-          <a:p>
-            <a:r>
-              <a:rPr lang="en-US" altLang="en-US" sz="2400" smtClean="0"/>
-              <a:t>Novel algorithms that exploit solution space structure to generate plan libraries, select &amp; configure algorithms, and decompose large problems</a:t>
-            </a:r>
-          </a:p>
-          <a:p>
-            <a:r>
-              <a:rPr lang="en-US" altLang="en-US" sz="2400" smtClean="0"/>
-              <a:t>Evaluation of these algorithms by comparison to competing techniques for a set of sample problems </a:t>
-            </a:r>
-          </a:p>
-        </p:txBody>
-      </p:sp>
-      <p:sp>
-        <p:nvSpPr>
-          <p:cNvPr id="10244" name="Slide Number Placeholder 3"/>
-          <p:cNvSpPr>
-            <a:spLocks noGrp="1"/>
-          </p:cNvSpPr>
-          <p:nvPr>
-            <p:ph type="sldNum" sz="quarter" idx="12"/>
-          </p:nvPr>
-        </p:nvSpPr>
-        <p:spPr>
-          <a:noFill/>
-          <a:ln/>
-          <a:extLst>
-            <a:ext uri="{909E8E84-426E-40DD-AFC4-6F175D3DCCD1}">
-              <a14:hiddenFill xmlns:a14="http://schemas.microsoft.com/office/drawing/2010/main">
-                <a:solidFill>
-                  <a:srgbClr val="FFFFFF"/>
-                </a:solidFill>
-              </a14:hiddenFill>
-            </a:ext>
-            <a:ext uri="{91240B29-F687-4F45-9708-019B960494DF}">
-              <a14:hiddenLine xmlns:a14="http://schemas.microsoft.com/office/drawing/2010/main" w="9525">
-                <a:solidFill>
-                  <a:srgbClr val="000000"/>
-                </a:solidFill>
-                <a:miter lim="800000"/>
-                <a:headEnd/>
-                <a:tailEnd/>
-              </a14:hiddenLine>
-            </a:ext>
-          </a:extLst>
-        </p:spPr>
-        <p:txBody>
-          <a:bodyPr/>
-          <a:lstStyle>
-            <a:lvl1pPr eaLnBrk="0" hangingPunct="0">
-              <a:defRPr>
-                <a:solidFill>
-                  <a:schemeClr val="tx1"/>
-                </a:solidFill>
-                <a:latin typeface="Arial" panose="020B0604020202020204" pitchFamily="34" charset="0"/>
-              </a:defRPr>
-            </a:lvl1pPr>
-            <a:lvl2pPr marL="742950" indent="-285750" eaLnBrk="0" hangingPunct="0">
-              <a:defRPr>
-                <a:solidFill>
-                  <a:schemeClr val="tx1"/>
-                </a:solidFill>
-                <a:latin typeface="Arial" panose="020B0604020202020204" pitchFamily="34" charset="0"/>
-              </a:defRPr>
-            </a:lvl2pPr>
-            <a:lvl3pPr marL="1143000" indent="-228600" eaLnBrk="0" hangingPunct="0">
-              <a:defRPr>
-                <a:solidFill>
-                  <a:schemeClr val="tx1"/>
-                </a:solidFill>
-                <a:latin typeface="Arial" panose="020B0604020202020204" pitchFamily="34" charset="0"/>
-              </a:defRPr>
-            </a:lvl3pPr>
-            <a:lvl4pPr marL="1600200" indent="-228600" eaLnBrk="0" hangingPunct="0">
-              <a:defRPr>
-                <a:solidFill>
-                  <a:schemeClr val="tx1"/>
-                </a:solidFill>
-                <a:latin typeface="Arial" panose="020B0604020202020204" pitchFamily="34" charset="0"/>
-              </a:defRPr>
-            </a:lvl4pPr>
-            <a:lvl5pPr marL="2057400" indent="-228600" eaLnBrk="0" hangingPunct="0">
-              <a:defRPr>
-                <a:solidFill>
-                  <a:schemeClr val="tx1"/>
-                </a:solidFill>
-                <a:latin typeface="Arial" panose="020B0604020202020204" pitchFamily="34" charset="0"/>
-              </a:defRPr>
-            </a:lvl5pPr>
-            <a:lvl6pPr marL="2514600" indent="-228600" eaLnBrk="0" fontAlgn="base" hangingPunct="0">
-              <a:spcBef>
-                <a:spcPct val="0"/>
-              </a:spcBef>
-              <a:spcAft>
-                <a:spcPct val="0"/>
-              </a:spcAft>
-              <a:defRPr>
-                <a:solidFill>
-                  <a:schemeClr val="tx1"/>
-                </a:solidFill>
-                <a:latin typeface="Arial" panose="020B0604020202020204" pitchFamily="34" charset="0"/>
-              </a:defRPr>
-            </a:lvl6pPr>
-            <a:lvl7pPr marL="2971800" indent="-228600" eaLnBrk="0" fontAlgn="base" hangingPunct="0">
-              <a:spcBef>
-                <a:spcPct val="0"/>
-              </a:spcBef>
-              <a:spcAft>
-                <a:spcPct val="0"/>
-              </a:spcAft>
-              <a:defRPr>
-                <a:solidFill>
-                  <a:schemeClr val="tx1"/>
-                </a:solidFill>
-                <a:latin typeface="Arial" panose="020B0604020202020204" pitchFamily="34" charset="0"/>
-              </a:defRPr>
-            </a:lvl7pPr>
-            <a:lvl8pPr marL="3429000" indent="-228600" eaLnBrk="0" fontAlgn="base" hangingPunct="0">
-              <a:spcBef>
-                <a:spcPct val="0"/>
-              </a:spcBef>
-              <a:spcAft>
-                <a:spcPct val="0"/>
-              </a:spcAft>
-              <a:defRPr>
-                <a:solidFill>
-                  <a:schemeClr val="tx1"/>
-                </a:solidFill>
-                <a:latin typeface="Arial" panose="020B0604020202020204" pitchFamily="34" charset="0"/>
-              </a:defRPr>
-            </a:lvl8pPr>
-            <a:lvl9pPr marL="3886200" indent="-228600" eaLnBrk="0" fontAlgn="base" hangingPunct="0">
-              <a:spcBef>
-                <a:spcPct val="0"/>
-              </a:spcBef>
-              <a:spcAft>
-                <a:spcPct val="0"/>
-              </a:spcAft>
-              <a:defRPr>
-                <a:solidFill>
-                  <a:schemeClr val="tx1"/>
-                </a:solidFill>
-                <a:latin typeface="Arial" panose="020B0604020202020204" pitchFamily="34" charset="0"/>
-              </a:defRPr>
-            </a:lvl9pPr>
-          </a:lstStyle>
-          <a:p>
-            <a:pPr eaLnBrk="1" hangingPunct="1"/>
-            <a:fld id="{61CC1C98-F26B-4DC2-9723-37E41C5A272D}" type="slidenum">
-              <a:rPr lang="en-US" altLang="en-US"/>
-              <a:pPr eaLnBrk="1" hangingPunct="1"/>
-              <a:t>6</a:t>
-            </a:fld>
-            <a:endParaRPr lang="en-US" altLang="en-US"/>
-          </a:p>
-        </p:txBody>
-      </p:sp>
-    </p:spTree>
-  </p:cSld>
-  <p:clrMapOvr>
-    <a:masterClrMapping/>
-  </p:clrMapOvr>
-  <p:timing>
-    <p:tnLst>
-      <p:par>
-        <p:cTn id="1" dur="indefinite" restart="never" nodeType="tmRoot"/>
-      </p:par>
-    </p:tnLst>
-  </p:timing>
-</p:sld>
-</file>
-
-<file path=ppt/slides/slide60.xml><?xml version="1.0" encoding="utf-8"?>
-<p:sld xmlns:a="http://schemas.openxmlformats.org/drawingml/2006/main" xmlns:r="http://schemas.openxmlformats.org/officeDocument/2006/relationships" xmlns:p="http://schemas.openxmlformats.org/presentationml/2006/main">
-  <p:cSld>
-    <p:spTree>
-      <p:nvGrpSpPr>
-        <p:cNvPr id="1" name=""/>
-        <p:cNvGrpSpPr/>
-        <p:nvPr/>
-      </p:nvGrpSpPr>
-      <p:grpSpPr>
-        <a:xfrm>
-          <a:off x="0" y="0"/>
-          <a:ext cx="0" cy="0"/>
-          <a:chOff x="0" y="0"/>
-          <a:chExt cx="0" cy="0"/>
-        </a:xfrm>
-      </p:grpSpPr>
-      <p:sp>
-        <p:nvSpPr>
-          <p:cNvPr id="59394" name="Slide Number Placeholder 5"/>
-          <p:cNvSpPr>
-            <a:spLocks noGrp="1"/>
-          </p:cNvSpPr>
-          <p:nvPr>
-            <p:ph type="sldNum" sz="quarter" idx="12"/>
-          </p:nvPr>
-        </p:nvSpPr>
-        <p:spPr>
-          <a:noFill/>
-          <a:ln/>
-          <a:extLst>
-            <a:ext uri="{909E8E84-426E-40DD-AFC4-6F175D3DCCD1}">
-              <a14:hiddenFill xmlns:a14="http://schemas.microsoft.com/office/drawing/2010/main">
-                <a:solidFill>
-                  <a:srgbClr val="FFFFFF"/>
-                </a:solidFill>
-              </a14:hiddenFill>
-            </a:ext>
-            <a:ext uri="{91240B29-F687-4F45-9708-019B960494DF}">
-              <a14:hiddenLine xmlns:a14="http://schemas.microsoft.com/office/drawing/2010/main" w="9525">
-                <a:solidFill>
-                  <a:srgbClr val="000000"/>
-                </a:solidFill>
-                <a:miter lim="800000"/>
-                <a:headEnd/>
-                <a:tailEnd/>
-              </a14:hiddenLine>
-            </a:ext>
-          </a:extLst>
-        </p:spPr>
-        <p:txBody>
-          <a:bodyPr/>
-          <a:lstStyle>
-            <a:lvl1pPr eaLnBrk="0" hangingPunct="0">
-              <a:defRPr>
-                <a:solidFill>
-                  <a:schemeClr val="tx1"/>
-                </a:solidFill>
-                <a:latin typeface="Arial" panose="020B0604020202020204" pitchFamily="34" charset="0"/>
-              </a:defRPr>
-            </a:lvl1pPr>
-            <a:lvl2pPr marL="742950" indent="-285750" eaLnBrk="0" hangingPunct="0">
-              <a:defRPr>
-                <a:solidFill>
-                  <a:schemeClr val="tx1"/>
-                </a:solidFill>
-                <a:latin typeface="Arial" panose="020B0604020202020204" pitchFamily="34" charset="0"/>
-              </a:defRPr>
-            </a:lvl2pPr>
-            <a:lvl3pPr marL="1143000" indent="-228600" eaLnBrk="0" hangingPunct="0">
-              <a:defRPr>
-                <a:solidFill>
-                  <a:schemeClr val="tx1"/>
-                </a:solidFill>
-                <a:latin typeface="Arial" panose="020B0604020202020204" pitchFamily="34" charset="0"/>
-              </a:defRPr>
-            </a:lvl3pPr>
-            <a:lvl4pPr marL="1600200" indent="-228600" eaLnBrk="0" hangingPunct="0">
-              <a:defRPr>
-                <a:solidFill>
-                  <a:schemeClr val="tx1"/>
-                </a:solidFill>
-                <a:latin typeface="Arial" panose="020B0604020202020204" pitchFamily="34" charset="0"/>
-              </a:defRPr>
-            </a:lvl4pPr>
-            <a:lvl5pPr marL="2057400" indent="-228600" eaLnBrk="0" hangingPunct="0">
-              <a:defRPr>
-                <a:solidFill>
-                  <a:schemeClr val="tx1"/>
-                </a:solidFill>
-                <a:latin typeface="Arial" panose="020B0604020202020204" pitchFamily="34" charset="0"/>
-              </a:defRPr>
-            </a:lvl5pPr>
-            <a:lvl6pPr marL="2514600" indent="-228600" eaLnBrk="0" fontAlgn="base" hangingPunct="0">
-              <a:spcBef>
-                <a:spcPct val="0"/>
-              </a:spcBef>
-              <a:spcAft>
-                <a:spcPct val="0"/>
-              </a:spcAft>
-              <a:defRPr>
-                <a:solidFill>
-                  <a:schemeClr val="tx1"/>
-                </a:solidFill>
-                <a:latin typeface="Arial" panose="020B0604020202020204" pitchFamily="34" charset="0"/>
-              </a:defRPr>
-            </a:lvl6pPr>
-            <a:lvl7pPr marL="2971800" indent="-228600" eaLnBrk="0" fontAlgn="base" hangingPunct="0">
-              <a:spcBef>
-                <a:spcPct val="0"/>
-              </a:spcBef>
-              <a:spcAft>
-                <a:spcPct val="0"/>
-              </a:spcAft>
-              <a:defRPr>
-                <a:solidFill>
-                  <a:schemeClr val="tx1"/>
-                </a:solidFill>
-                <a:latin typeface="Arial" panose="020B0604020202020204" pitchFamily="34" charset="0"/>
-              </a:defRPr>
-            </a:lvl7pPr>
-            <a:lvl8pPr marL="3429000" indent="-228600" eaLnBrk="0" fontAlgn="base" hangingPunct="0">
-              <a:spcBef>
-                <a:spcPct val="0"/>
-              </a:spcBef>
-              <a:spcAft>
-                <a:spcPct val="0"/>
-              </a:spcAft>
-              <a:defRPr>
-                <a:solidFill>
-                  <a:schemeClr val="tx1"/>
-                </a:solidFill>
-                <a:latin typeface="Arial" panose="020B0604020202020204" pitchFamily="34" charset="0"/>
-              </a:defRPr>
-            </a:lvl8pPr>
-            <a:lvl9pPr marL="3886200" indent="-228600" eaLnBrk="0" fontAlgn="base" hangingPunct="0">
-              <a:spcBef>
-                <a:spcPct val="0"/>
-              </a:spcBef>
-              <a:spcAft>
-                <a:spcPct val="0"/>
-              </a:spcAft>
-              <a:defRPr>
-                <a:solidFill>
-                  <a:schemeClr val="tx1"/>
-                </a:solidFill>
-                <a:latin typeface="Arial" panose="020B0604020202020204" pitchFamily="34" charset="0"/>
-              </a:defRPr>
-            </a:lvl9pPr>
-          </a:lstStyle>
-          <a:p>
-            <a:pPr eaLnBrk="1" hangingPunct="1"/>
-            <a:fld id="{8840FCE9-7EA8-477A-BB69-EAB1D9912F2C}" type="slidenum">
-              <a:rPr lang="en-US" altLang="en-US"/>
-              <a:pPr eaLnBrk="1" hangingPunct="1"/>
-              <a:t>60</a:t>
-            </a:fld>
-            <a:endParaRPr lang="en-US" altLang="en-US"/>
-          </a:p>
-        </p:txBody>
-      </p:sp>
-      <p:sp>
-        <p:nvSpPr>
-          <p:cNvPr id="59395" name="Rectangle 2"/>
-          <p:cNvSpPr>
-            <a:spLocks noGrp="1" noChangeArrowheads="1"/>
-          </p:cNvSpPr>
-          <p:nvPr>
-            <p:ph type="title"/>
-          </p:nvPr>
-        </p:nvSpPr>
-        <p:spPr/>
-        <p:txBody>
-          <a:bodyPr/>
-          <a:lstStyle/>
-          <a:p>
-            <a:pPr eaLnBrk="1" hangingPunct="1"/>
-            <a:r>
-              <a:rPr lang="en-US" altLang="en-US" dirty="0" smtClean="0"/>
-              <a:t>Summary</a:t>
-            </a:r>
-            <a:br>
-              <a:rPr lang="en-US" altLang="en-US" dirty="0" smtClean="0"/>
-            </a:br>
-            <a:endParaRPr lang="en-US" altLang="en-US" dirty="0" smtClean="0"/>
-          </a:p>
-        </p:txBody>
-      </p:sp>
-      <p:sp>
-        <p:nvSpPr>
-          <p:cNvPr id="59396" name="Rectangle 3"/>
-          <p:cNvSpPr>
-            <a:spLocks noGrp="1" noChangeArrowheads="1"/>
-          </p:cNvSpPr>
-          <p:nvPr>
-            <p:ph type="body" idx="1"/>
-          </p:nvPr>
-        </p:nvSpPr>
-        <p:spPr/>
-        <p:txBody>
-          <a:bodyPr/>
-          <a:lstStyle/>
-          <a:p>
-            <a:pPr eaLnBrk="1" hangingPunct="1"/>
-            <a:r>
-              <a:rPr lang="en-US" altLang="en-US" sz="2600" smtClean="0"/>
-              <a:t>Use of problem space analysis to facilitate real-time planning </a:t>
-            </a:r>
-          </a:p>
-          <a:p>
-            <a:pPr lvl="1" eaLnBrk="1" hangingPunct="1"/>
-            <a:r>
-              <a:rPr lang="en-US" altLang="en-US" sz="2200" smtClean="0"/>
-              <a:t>plan library creation</a:t>
-            </a:r>
-          </a:p>
-          <a:p>
-            <a:pPr lvl="1" eaLnBrk="1" hangingPunct="1"/>
-            <a:r>
-              <a:rPr lang="en-US" altLang="en-US" sz="2200" smtClean="0"/>
-              <a:t>algorithm selection</a:t>
-            </a:r>
-          </a:p>
-          <a:p>
-            <a:pPr lvl="1" eaLnBrk="1" hangingPunct="1"/>
-            <a:r>
-              <a:rPr lang="en-US" altLang="en-US" sz="2200" smtClean="0"/>
-              <a:t>problem decomposition</a:t>
-            </a:r>
-          </a:p>
-          <a:p>
-            <a:pPr eaLnBrk="1" hangingPunct="1"/>
-            <a:r>
-              <a:rPr lang="en-US" altLang="en-US" sz="2600" smtClean="0"/>
-              <a:t>Use of sampling and interpolation techniques to create problem space maps</a:t>
-            </a:r>
-          </a:p>
-          <a:p>
-            <a:pPr lvl="1" eaLnBrk="1" hangingPunct="1"/>
-            <a:r>
-              <a:rPr lang="en-US" altLang="en-US" sz="2200" smtClean="0"/>
-              <a:t>traditional techniques</a:t>
-            </a:r>
-          </a:p>
-          <a:p>
-            <a:pPr lvl="1" eaLnBrk="1" hangingPunct="1"/>
-            <a:r>
-              <a:rPr lang="en-US" altLang="en-US" sz="2200" smtClean="0"/>
-              <a:t>domain-based hints</a:t>
-            </a:r>
-          </a:p>
-          <a:p>
-            <a:pPr lvl="1" eaLnBrk="1" hangingPunct="1"/>
-            <a:r>
-              <a:rPr lang="en-US" altLang="en-US" sz="2200" smtClean="0"/>
-              <a:t>informed kernel selection</a:t>
-            </a:r>
-          </a:p>
-        </p:txBody>
-      </p:sp>
-    </p:spTree>
-  </p:cSld>
-  <p:clrMapOvr>
-    <a:masterClrMapping/>
-  </p:clrMapOvr>
-  <p:timing>
-    <p:tnLst>
-      <p:par>
-        <p:cTn id="1" dur="indefinite" restart="never" nodeType="tmRoot"/>
-      </p:par>
-    </p:tnLst>
-  </p:timing>
-</p:sld>
-</file>
-
 <file path=ppt/slides/slide61.xml><?xml version="1.0" encoding="utf-8"?>
 <p:sld xmlns:a="http://schemas.openxmlformats.org/drawingml/2006/main" xmlns:r="http://schemas.openxmlformats.org/officeDocument/2006/relationships" xmlns:p="http://schemas.openxmlformats.org/presentationml/2006/main">
   <p:cSld>
@@ -48455,7 +48047,7 @@
       </p:grpSpPr>
       <p:sp>
         <p:nvSpPr>
-          <p:cNvPr id="60418" name="Title 1"/>
+          <p:cNvPr id="62466" name="Title 1"/>
           <p:cNvSpPr>
             <a:spLocks noGrp="1"/>
           </p:cNvSpPr>
@@ -48469,19 +48061,19 @@
           <a:lstStyle/>
           <a:p>
             <a:r>
-              <a:rPr lang="en-US" altLang="en-US" dirty="0" smtClean="0"/>
-              <a:t>References</a:t>
+              <a:rPr lang="en-US" altLang="en-US" smtClean="0"/>
+              <a:t>Backup</a:t>
             </a:r>
             <a:br>
-              <a:rPr lang="en-US" altLang="en-US" dirty="0" smtClean="0"/>
+              <a:rPr lang="en-US" altLang="en-US" smtClean="0"/>
             </a:br>
-            <a:endParaRPr lang="en-US" altLang="en-US" dirty="0" smtClean="0"/>
-          </a:p>
-        </p:txBody>
-      </p:sp>
-      <p:sp>
-        <p:nvSpPr>
-          <p:cNvPr id="60419" name="Content Placeholder 2"/>
+            <a:endParaRPr lang="en-US" altLang="en-US" smtClean="0"/>
+          </a:p>
+        </p:txBody>
+      </p:sp>
+      <p:sp>
+        <p:nvSpPr>
+          <p:cNvPr id="62467" name="Content Placeholder 2"/>
           <p:cNvSpPr>
             <a:spLocks noGrp="1"/>
           </p:cNvSpPr>
@@ -48494,77 +48086,13 @@
           <a:bodyPr/>
           <a:lstStyle/>
           <a:p>
-            <a:r>
-              <a:rPr lang="en-US" altLang="en-US" sz="1600" smtClean="0"/>
-              <a:t>Bulka (2009) “Efficient Planning Using Plan Libraries to Capture the Structure of the State Space”</a:t>
-            </a:r>
-          </a:p>
-          <a:p>
-            <a:pPr eaLnBrk="1" hangingPunct="1"/>
-            <a:r>
-              <a:rPr lang="en-US" altLang="en-US" sz="1600" smtClean="0"/>
-              <a:t>Gopal &amp; Starkschall (2002) “Plan space: representation of treatment plans in multidimensional space”</a:t>
-            </a:r>
-          </a:p>
-          <a:p>
-            <a:r>
-              <a:rPr lang="en-US" altLang="en-US" sz="1600" smtClean="0"/>
-              <a:t>Hoffman (2001) “Local Search Topology in Planning Benchmarks: An Empirical Analysis”</a:t>
-            </a:r>
-          </a:p>
-          <a:p>
-            <a:pPr eaLnBrk="1" hangingPunct="1"/>
-            <a:r>
-              <a:rPr lang="en-US" altLang="en-US" sz="1600" smtClean="0"/>
-              <a:t>Hoffman &amp; Nebel (2001) “The FF Planning System: Fast Plan Generation Through Heuristic Search”</a:t>
-            </a:r>
-          </a:p>
-          <a:p>
-            <a:pPr eaLnBrk="1" hangingPunct="1"/>
-            <a:r>
-              <a:rPr lang="en-US" altLang="en-US" sz="1600" smtClean="0"/>
-              <a:t>Onder &amp; Pollack (1996) “Contingency Selection in Plan Generation”</a:t>
-            </a:r>
-          </a:p>
-          <a:p>
-            <a:r>
-              <a:rPr lang="en-US" altLang="en-US" sz="1600" smtClean="0"/>
-              <a:t>Kondaris (2008) “Autonomous Robot Skill Acquisition”</a:t>
-            </a:r>
-          </a:p>
-          <a:p>
-            <a:pPr eaLnBrk="1" hangingPunct="1"/>
-            <a:r>
-              <a:rPr lang="en-US" altLang="en-US" sz="1600" smtClean="0"/>
-              <a:t>Miner (2009) “Rule Abstraction: Understanding Emergent Behavior in Swarm Systems”</a:t>
-            </a:r>
-          </a:p>
-          <a:p>
-            <a:pPr eaLnBrk="1" hangingPunct="1"/>
-            <a:r>
-              <a:rPr lang="en-US" altLang="en-US" sz="1600" smtClean="0"/>
-              <a:t>Smyth &amp; McKenny (2001) “Competence Models and the Maintenance Problem”</a:t>
-            </a:r>
-          </a:p>
-          <a:p>
-            <a:pPr eaLnBrk="1" hangingPunct="1"/>
-            <a:r>
-              <a:rPr lang="en-US" altLang="en-US" sz="1600" smtClean="0"/>
-              <a:t>Rosen, et. al. (2005) “Interactively exploring optimized treatment plans”</a:t>
-            </a:r>
-          </a:p>
-          <a:p>
-            <a:pPr eaLnBrk="1" hangingPunct="1"/>
-            <a:r>
-              <a:rPr lang="en-US" altLang="en-US" sz="1600" smtClean="0"/>
-              <a:t>Trinquart (2003) “Analyzing Reachability within Plan Space”</a:t>
-            </a:r>
-          </a:p>
-        </p:txBody>
-      </p:sp>
-      <p:sp>
-        <p:nvSpPr>
-          <p:cNvPr id="60420" name="Slide Number Placeholder 3"/>
+            <a:endParaRPr lang="en-US" altLang="en-US" smtClean="0"/>
+          </a:p>
+        </p:txBody>
+      </p:sp>
+      <p:sp>
+        <p:nvSpPr>
+          <p:cNvPr id="62468" name="Slide Number Placeholder 3"/>
           <p:cNvSpPr>
             <a:spLocks noGrp="1"/>
           </p:cNvSpPr>
@@ -48697,7 +48225,7 @@
           </a:lstStyle>
           <a:p>
             <a:pPr eaLnBrk="1" hangingPunct="1"/>
-            <a:fld id="{C5047C29-7B47-4D60-AFC2-1146D3E8AC4A}" type="slidenum">
+            <a:fld id="{072BC278-562D-4543-9C02-5D9B4D62CA1B}" type="slidenum">
               <a:rPr lang="en-US" altLang="en-US"/>
               <a:pPr eaLnBrk="1" hangingPunct="1"/>
               <a:t>61</a:t>
@@ -48740,7 +48268,7 @@
       </p:grpSpPr>
       <p:sp>
         <p:nvSpPr>
-          <p:cNvPr id="63490" name="Title 1"/>
+          <p:cNvPr id="55298" name="Title 1"/>
           <p:cNvSpPr>
             <a:spLocks noGrp="1"/>
           </p:cNvSpPr>
@@ -48754,22 +48282,59 @@
           <a:lstStyle/>
           <a:p>
             <a:r>
-              <a:rPr lang="en-US" altLang="en-US" smtClean="0"/>
-              <a:t>Related Work –</a:t>
+              <a:rPr lang="en-US" altLang="en-US" dirty="0" smtClean="0"/>
+              <a:t>Research Plan Goals</a:t>
             </a:r>
             <a:br>
-              <a:rPr lang="en-US" altLang="en-US" smtClean="0"/>
+              <a:rPr lang="en-US" altLang="en-US" dirty="0" smtClean="0"/>
             </a:br>
+            <a:endParaRPr lang="en-US" altLang="en-US" dirty="0" smtClean="0"/>
+          </a:p>
+        </p:txBody>
+      </p:sp>
+      <p:sp>
+        <p:nvSpPr>
+          <p:cNvPr id="55299" name="Content Placeholder 2"/>
+          <p:cNvSpPr>
+            <a:spLocks noGrp="1"/>
+          </p:cNvSpPr>
+          <p:nvPr>
+            <p:ph idx="1"/>
+          </p:nvPr>
+        </p:nvSpPr>
+        <p:spPr/>
+        <p:txBody>
+          <a:bodyPr/>
+          <a:lstStyle/>
+          <a:p>
             <a:r>
-              <a:rPr lang="en-US" altLang="en-US" smtClean="0"/>
-              <a:t>Contingency Planning</a:t>
+              <a:rPr lang="en-US" altLang="en-US" sz="2400" smtClean="0"/>
+              <a:t>Investigate inferring a problem space analysis and solution topology from a sample set of problem instance and solution pairs</a:t>
             </a:r>
           </a:p>
-        </p:txBody>
-      </p:sp>
-      <p:sp>
-        <p:nvSpPr>
-          <p:cNvPr id="63491" name="Slide Number Placeholder 3"/>
+          <a:p>
+            <a:r>
+              <a:rPr lang="en-US" altLang="en-US" sz="2400" smtClean="0"/>
+              <a:t>Apply problem space analysis and other domain characteristics to the creation of an efficient plan library</a:t>
+            </a:r>
+          </a:p>
+          <a:p>
+            <a:r>
+              <a:rPr lang="en-US" altLang="en-US" sz="2400" smtClean="0"/>
+              <a:t>Apply problem space analysis to the selection of algorithms suited for a particular region of the problem space</a:t>
+            </a:r>
+          </a:p>
+          <a:p>
+            <a:r>
+              <a:rPr lang="en-US" altLang="en-US" sz="2400" smtClean="0"/>
+              <a:t>Apply problem space analysis to strategic decomposition of large planning problems</a:t>
+            </a:r>
+          </a:p>
+        </p:txBody>
+      </p:sp>
+      <p:sp>
+        <p:nvSpPr>
+          <p:cNvPr id="55300" name="Slide Number Placeholder 3"/>
           <p:cNvSpPr>
             <a:spLocks noGrp="1"/>
           </p:cNvSpPr>
@@ -48902,193 +48467,12 @@
           </a:lstStyle>
           <a:p>
             <a:pPr eaLnBrk="1" hangingPunct="1"/>
-            <a:fld id="{35E8037D-8104-4D43-A200-A2C3F6CCCDC0}" type="slidenum">
+            <a:fld id="{AA89C6D4-039B-4EF3-8C72-8A9E41922F60}" type="slidenum">
               <a:rPr lang="en-US" altLang="en-US"/>
               <a:pPr eaLnBrk="1" hangingPunct="1"/>
               <a:t>62</a:t>
             </a:fld>
             <a:endParaRPr lang="en-US" altLang="en-US"/>
-          </a:p>
-        </p:txBody>
-      </p:sp>
-      <p:pic>
-        <p:nvPicPr>
-          <p:cNvPr id="63492" name="Picture 2"/>
-          <p:cNvPicPr>
-            <a:picLocks noGrp="1" noChangeAspect="1" noChangeArrowheads="1"/>
-          </p:cNvPicPr>
-          <p:nvPr>
-            <p:ph idx="1"/>
-          </p:nvPr>
-        </p:nvPicPr>
-        <p:blipFill>
-          <a:blip r:embed="rId2">
-            <a:extLst>
-              <a:ext uri="{28A0092B-C50C-407E-A947-70E740481C1C}">
-                <a14:useLocalDpi xmlns:a14="http://schemas.microsoft.com/office/drawing/2010/main" val="0"/>
-              </a:ext>
-            </a:extLst>
-          </a:blip>
-          <a:srcRect/>
-          <a:stretch>
-            <a:fillRect/>
-          </a:stretch>
-        </p:blipFill>
-        <p:spPr>
-          <a:xfrm>
-            <a:off x="457200" y="1524000"/>
-            <a:ext cx="8143875" cy="3894138"/>
-          </a:xfrm>
-        </p:spPr>
-      </p:pic>
-      <p:sp>
-        <p:nvSpPr>
-          <p:cNvPr id="63493" name="TextBox 6"/>
-          <p:cNvSpPr txBox="1">
-            <a:spLocks noChangeArrowheads="1"/>
-          </p:cNvSpPr>
-          <p:nvPr/>
-        </p:nvSpPr>
-        <p:spPr bwMode="auto">
-          <a:xfrm>
-            <a:off x="609600" y="5486400"/>
-            <a:ext cx="2582863" cy="369888"/>
-          </a:xfrm>
-          <a:prstGeom prst="rect">
-            <a:avLst/>
-          </a:prstGeom>
-          <a:noFill/>
-          <a:ln>
-            <a:noFill/>
-          </a:ln>
-          <a:extLst>
-            <a:ext uri="{909E8E84-426E-40DD-AFC4-6F175D3DCCD1}">
-              <a14:hiddenFill xmlns:a14="http://schemas.microsoft.com/office/drawing/2010/main">
-                <a:solidFill>
-                  <a:srgbClr val="FFFFFF"/>
-                </a:solidFill>
-              </a14:hiddenFill>
-            </a:ext>
-            <a:ext uri="{91240B29-F687-4F45-9708-019B960494DF}">
-              <a14:hiddenLine xmlns:a14="http://schemas.microsoft.com/office/drawing/2010/main" w="9525">
-                <a:solidFill>
-                  <a:srgbClr val="000000"/>
-                </a:solidFill>
-                <a:miter lim="800000"/>
-                <a:headEnd/>
-                <a:tailEnd/>
-              </a14:hiddenLine>
-            </a:ext>
-          </a:extLst>
-        </p:spPr>
-        <p:txBody>
-          <a:bodyPr wrap="none">
-            <a:spAutoFit/>
-          </a:bodyPr>
-          <a:lstStyle>
-            <a:lvl1pPr eaLnBrk="0" hangingPunct="0">
-              <a:defRPr>
-                <a:solidFill>
-                  <a:schemeClr val="tx1"/>
-                </a:solidFill>
-                <a:latin typeface="Arial" panose="020B0604020202020204" pitchFamily="34" charset="0"/>
-              </a:defRPr>
-            </a:lvl1pPr>
-            <a:lvl2pPr marL="742950" indent="-285750" eaLnBrk="0" hangingPunct="0">
-              <a:defRPr>
-                <a:solidFill>
-                  <a:schemeClr val="tx1"/>
-                </a:solidFill>
-                <a:latin typeface="Arial" panose="020B0604020202020204" pitchFamily="34" charset="0"/>
-              </a:defRPr>
-            </a:lvl2pPr>
-            <a:lvl3pPr marL="1143000" indent="-228600" eaLnBrk="0" hangingPunct="0">
-              <a:defRPr>
-                <a:solidFill>
-                  <a:schemeClr val="tx1"/>
-                </a:solidFill>
-                <a:latin typeface="Arial" panose="020B0604020202020204" pitchFamily="34" charset="0"/>
-              </a:defRPr>
-            </a:lvl3pPr>
-            <a:lvl4pPr marL="1600200" indent="-228600" eaLnBrk="0" hangingPunct="0">
-              <a:defRPr>
-                <a:solidFill>
-                  <a:schemeClr val="tx1"/>
-                </a:solidFill>
-                <a:latin typeface="Arial" panose="020B0604020202020204" pitchFamily="34" charset="0"/>
-              </a:defRPr>
-            </a:lvl4pPr>
-            <a:lvl5pPr marL="2057400" indent="-228600" eaLnBrk="0" hangingPunct="0">
-              <a:defRPr>
-                <a:solidFill>
-                  <a:schemeClr val="tx1"/>
-                </a:solidFill>
-                <a:latin typeface="Arial" panose="020B0604020202020204" pitchFamily="34" charset="0"/>
-              </a:defRPr>
-            </a:lvl5pPr>
-            <a:lvl6pPr marL="2514600" indent="-228600" eaLnBrk="0" fontAlgn="base" hangingPunct="0">
-              <a:spcBef>
-                <a:spcPct val="0"/>
-              </a:spcBef>
-              <a:spcAft>
-                <a:spcPct val="0"/>
-              </a:spcAft>
-              <a:defRPr>
-                <a:solidFill>
-                  <a:schemeClr val="tx1"/>
-                </a:solidFill>
-                <a:latin typeface="Arial" panose="020B0604020202020204" pitchFamily="34" charset="0"/>
-              </a:defRPr>
-            </a:lvl6pPr>
-            <a:lvl7pPr marL="2971800" indent="-228600" eaLnBrk="0" fontAlgn="base" hangingPunct="0">
-              <a:spcBef>
-                <a:spcPct val="0"/>
-              </a:spcBef>
-              <a:spcAft>
-                <a:spcPct val="0"/>
-              </a:spcAft>
-              <a:defRPr>
-                <a:solidFill>
-                  <a:schemeClr val="tx1"/>
-                </a:solidFill>
-                <a:latin typeface="Arial" panose="020B0604020202020204" pitchFamily="34" charset="0"/>
-              </a:defRPr>
-            </a:lvl7pPr>
-            <a:lvl8pPr marL="3429000" indent="-228600" eaLnBrk="0" fontAlgn="base" hangingPunct="0">
-              <a:spcBef>
-                <a:spcPct val="0"/>
-              </a:spcBef>
-              <a:spcAft>
-                <a:spcPct val="0"/>
-              </a:spcAft>
-              <a:defRPr>
-                <a:solidFill>
-                  <a:schemeClr val="tx1"/>
-                </a:solidFill>
-                <a:latin typeface="Arial" panose="020B0604020202020204" pitchFamily="34" charset="0"/>
-              </a:defRPr>
-            </a:lvl8pPr>
-            <a:lvl9pPr marL="3886200" indent="-228600" eaLnBrk="0" fontAlgn="base" hangingPunct="0">
-              <a:spcBef>
-                <a:spcPct val="0"/>
-              </a:spcBef>
-              <a:spcAft>
-                <a:spcPct val="0"/>
-              </a:spcAft>
-              <a:defRPr>
-                <a:solidFill>
-                  <a:schemeClr val="tx1"/>
-                </a:solidFill>
-                <a:latin typeface="Arial" panose="020B0604020202020204" pitchFamily="34" charset="0"/>
-              </a:defRPr>
-            </a:lvl9pPr>
-          </a:lstStyle>
-          <a:p>
-            <a:pPr eaLnBrk="1" hangingPunct="1"/>
-            <a:r>
-              <a:rPr lang="en-US" altLang="en-US"/>
-              <a:t>Onder &amp; Pollock (1996)</a:t>
-            </a:r>
           </a:p>
         </p:txBody>
       </p:sp>
@@ -49126,6 +48510,1194 @@
       </p:grpSpPr>
       <p:sp>
         <p:nvSpPr>
+          <p:cNvPr id="58370" name="Title 1"/>
+          <p:cNvSpPr>
+            <a:spLocks noGrp="1"/>
+          </p:cNvSpPr>
+          <p:nvPr>
+            <p:ph type="title"/>
+          </p:nvPr>
+        </p:nvSpPr>
+        <p:spPr/>
+        <p:txBody>
+          <a:bodyPr/>
+          <a:lstStyle/>
+          <a:p>
+            <a:r>
+              <a:rPr lang="en-US" altLang="en-US" dirty="0" smtClean="0"/>
+              <a:t>Contributions</a:t>
+            </a:r>
+            <a:br>
+              <a:rPr lang="en-US" altLang="en-US" dirty="0" smtClean="0"/>
+            </a:br>
+            <a:endParaRPr lang="en-US" altLang="en-US" dirty="0" smtClean="0"/>
+          </a:p>
+        </p:txBody>
+      </p:sp>
+      <p:sp>
+        <p:nvSpPr>
+          <p:cNvPr id="58371" name="Content Placeholder 2"/>
+          <p:cNvSpPr>
+            <a:spLocks noGrp="1"/>
+          </p:cNvSpPr>
+          <p:nvPr>
+            <p:ph idx="1"/>
+          </p:nvPr>
+        </p:nvSpPr>
+        <p:spPr/>
+        <p:txBody>
+          <a:bodyPr/>
+          <a:lstStyle/>
+          <a:p>
+            <a:r>
+              <a:rPr lang="en-US" altLang="en-US" sz="2400" smtClean="0"/>
+              <a:t>Framework to model and reason about the topological structure of the solutions of related plans</a:t>
+            </a:r>
+          </a:p>
+          <a:p>
+            <a:r>
+              <a:rPr lang="en-US" altLang="en-US" sz="2400" smtClean="0"/>
+              <a:t>Techniques to predict and leverage the effect of problem instance characteristics and attributes on the topological structure of the solution space</a:t>
+            </a:r>
+          </a:p>
+          <a:p>
+            <a:r>
+              <a:rPr lang="en-US" altLang="en-US" sz="2400" smtClean="0"/>
+              <a:t>Novel algorithms that exploit solution space structure to generate plan libraries, select &amp; configure algorithms, and decompose large problems</a:t>
+            </a:r>
+          </a:p>
+          <a:p>
+            <a:r>
+              <a:rPr lang="en-US" altLang="en-US" sz="2400" smtClean="0"/>
+              <a:t>Evaluation of these algorithms on a sample problems by comparison to competing techniques</a:t>
+            </a:r>
+          </a:p>
+        </p:txBody>
+      </p:sp>
+      <p:sp>
+        <p:nvSpPr>
+          <p:cNvPr id="58372" name="Slide Number Placeholder 3"/>
+          <p:cNvSpPr>
+            <a:spLocks noGrp="1"/>
+          </p:cNvSpPr>
+          <p:nvPr>
+            <p:ph type="sldNum" sz="quarter" idx="12"/>
+          </p:nvPr>
+        </p:nvSpPr>
+        <p:spPr>
+          <a:noFill/>
+          <a:ln/>
+          <a:extLst>
+            <a:ext uri="{909E8E84-426E-40DD-AFC4-6F175D3DCCD1}">
+              <a14:hiddenFill xmlns:a14="http://schemas.microsoft.com/office/drawing/2010/main">
+                <a:solidFill>
+                  <a:srgbClr val="FFFFFF"/>
+                </a:solidFill>
+              </a14:hiddenFill>
+            </a:ext>
+            <a:ext uri="{91240B29-F687-4F45-9708-019B960494DF}">
+              <a14:hiddenLine xmlns:a14="http://schemas.microsoft.com/office/drawing/2010/main" w="9525">
+                <a:solidFill>
+                  <a:srgbClr val="000000"/>
+                </a:solidFill>
+                <a:miter lim="800000"/>
+                <a:headEnd/>
+                <a:tailEnd/>
+              </a14:hiddenLine>
+            </a:ext>
+          </a:extLst>
+        </p:spPr>
+        <p:txBody>
+          <a:bodyPr/>
+          <a:lstStyle>
+            <a:lvl1pPr eaLnBrk="0" hangingPunct="0">
+              <a:defRPr>
+                <a:solidFill>
+                  <a:schemeClr val="tx1"/>
+                </a:solidFill>
+                <a:latin typeface="Arial" panose="020B0604020202020204" pitchFamily="34" charset="0"/>
+              </a:defRPr>
+            </a:lvl1pPr>
+            <a:lvl2pPr marL="742950" indent="-285750" eaLnBrk="0" hangingPunct="0">
+              <a:defRPr>
+                <a:solidFill>
+                  <a:schemeClr val="tx1"/>
+                </a:solidFill>
+                <a:latin typeface="Arial" panose="020B0604020202020204" pitchFamily="34" charset="0"/>
+              </a:defRPr>
+            </a:lvl2pPr>
+            <a:lvl3pPr marL="1143000" indent="-228600" eaLnBrk="0" hangingPunct="0">
+              <a:defRPr>
+                <a:solidFill>
+                  <a:schemeClr val="tx1"/>
+                </a:solidFill>
+                <a:latin typeface="Arial" panose="020B0604020202020204" pitchFamily="34" charset="0"/>
+              </a:defRPr>
+            </a:lvl3pPr>
+            <a:lvl4pPr marL="1600200" indent="-228600" eaLnBrk="0" hangingPunct="0">
+              <a:defRPr>
+                <a:solidFill>
+                  <a:schemeClr val="tx1"/>
+                </a:solidFill>
+                <a:latin typeface="Arial" panose="020B0604020202020204" pitchFamily="34" charset="0"/>
+              </a:defRPr>
+            </a:lvl4pPr>
+            <a:lvl5pPr marL="2057400" indent="-228600" eaLnBrk="0" hangingPunct="0">
+              <a:defRPr>
+                <a:solidFill>
+                  <a:schemeClr val="tx1"/>
+                </a:solidFill>
+                <a:latin typeface="Arial" panose="020B0604020202020204" pitchFamily="34" charset="0"/>
+              </a:defRPr>
+            </a:lvl5pPr>
+            <a:lvl6pPr marL="2514600" indent="-228600" eaLnBrk="0" fontAlgn="base" hangingPunct="0">
+              <a:spcBef>
+                <a:spcPct val="0"/>
+              </a:spcBef>
+              <a:spcAft>
+                <a:spcPct val="0"/>
+              </a:spcAft>
+              <a:defRPr>
+                <a:solidFill>
+                  <a:schemeClr val="tx1"/>
+                </a:solidFill>
+                <a:latin typeface="Arial" panose="020B0604020202020204" pitchFamily="34" charset="0"/>
+              </a:defRPr>
+            </a:lvl6pPr>
+            <a:lvl7pPr marL="2971800" indent="-228600" eaLnBrk="0" fontAlgn="base" hangingPunct="0">
+              <a:spcBef>
+                <a:spcPct val="0"/>
+              </a:spcBef>
+              <a:spcAft>
+                <a:spcPct val="0"/>
+              </a:spcAft>
+              <a:defRPr>
+                <a:solidFill>
+                  <a:schemeClr val="tx1"/>
+                </a:solidFill>
+                <a:latin typeface="Arial" panose="020B0604020202020204" pitchFamily="34" charset="0"/>
+              </a:defRPr>
+            </a:lvl7pPr>
+            <a:lvl8pPr marL="3429000" indent="-228600" eaLnBrk="0" fontAlgn="base" hangingPunct="0">
+              <a:spcBef>
+                <a:spcPct val="0"/>
+              </a:spcBef>
+              <a:spcAft>
+                <a:spcPct val="0"/>
+              </a:spcAft>
+              <a:defRPr>
+                <a:solidFill>
+                  <a:schemeClr val="tx1"/>
+                </a:solidFill>
+                <a:latin typeface="Arial" panose="020B0604020202020204" pitchFamily="34" charset="0"/>
+              </a:defRPr>
+            </a:lvl8pPr>
+            <a:lvl9pPr marL="3886200" indent="-228600" eaLnBrk="0" fontAlgn="base" hangingPunct="0">
+              <a:spcBef>
+                <a:spcPct val="0"/>
+              </a:spcBef>
+              <a:spcAft>
+                <a:spcPct val="0"/>
+              </a:spcAft>
+              <a:defRPr>
+                <a:solidFill>
+                  <a:schemeClr val="tx1"/>
+                </a:solidFill>
+                <a:latin typeface="Arial" panose="020B0604020202020204" pitchFamily="34" charset="0"/>
+              </a:defRPr>
+            </a:lvl9pPr>
+          </a:lstStyle>
+          <a:p>
+            <a:pPr eaLnBrk="1" hangingPunct="1"/>
+            <a:fld id="{583A6B54-2945-49C3-920D-BEE8A5CA810C}" type="slidenum">
+              <a:rPr lang="en-US" altLang="en-US"/>
+              <a:pPr eaLnBrk="1" hangingPunct="1"/>
+              <a:t>63</a:t>
+            </a:fld>
+            <a:endParaRPr lang="en-US" altLang="en-US"/>
+          </a:p>
+        </p:txBody>
+      </p:sp>
+    </p:spTree>
+  </p:cSld>
+  <p:clrMapOvr>
+    <a:masterClrMapping/>
+  </p:clrMapOvr>
+  <p:timing>
+    <p:tnLst>
+      <p:par>
+        <p:cTn id="1" dur="indefinite" restart="never" nodeType="tmRoot"/>
+      </p:par>
+    </p:tnLst>
+  </p:timing>
+</p:sld>
+</file>
+
+<file path=ppt/slides/slide64.xml><?xml version="1.0" encoding="utf-8"?>
+<p:sld xmlns:a="http://schemas.openxmlformats.org/drawingml/2006/main" xmlns:r="http://schemas.openxmlformats.org/officeDocument/2006/relationships" xmlns:p="http://schemas.openxmlformats.org/presentationml/2006/main">
+  <p:cSld>
+    <p:spTree>
+      <p:nvGrpSpPr>
+        <p:cNvPr id="1" name=""/>
+        <p:cNvGrpSpPr/>
+        <p:nvPr/>
+      </p:nvGrpSpPr>
+      <p:grpSpPr>
+        <a:xfrm>
+          <a:off x="0" y="0"/>
+          <a:ext cx="0" cy="0"/>
+          <a:chOff x="0" y="0"/>
+          <a:chExt cx="0" cy="0"/>
+        </a:xfrm>
+      </p:grpSpPr>
+      <p:sp>
+        <p:nvSpPr>
+          <p:cNvPr id="59394" name="Slide Number Placeholder 5"/>
+          <p:cNvSpPr>
+            <a:spLocks noGrp="1"/>
+          </p:cNvSpPr>
+          <p:nvPr>
+            <p:ph type="sldNum" sz="quarter" idx="12"/>
+          </p:nvPr>
+        </p:nvSpPr>
+        <p:spPr>
+          <a:noFill/>
+          <a:ln/>
+          <a:extLst>
+            <a:ext uri="{909E8E84-426E-40DD-AFC4-6F175D3DCCD1}">
+              <a14:hiddenFill xmlns:a14="http://schemas.microsoft.com/office/drawing/2010/main">
+                <a:solidFill>
+                  <a:srgbClr val="FFFFFF"/>
+                </a:solidFill>
+              </a14:hiddenFill>
+            </a:ext>
+            <a:ext uri="{91240B29-F687-4F45-9708-019B960494DF}">
+              <a14:hiddenLine xmlns:a14="http://schemas.microsoft.com/office/drawing/2010/main" w="9525">
+                <a:solidFill>
+                  <a:srgbClr val="000000"/>
+                </a:solidFill>
+                <a:miter lim="800000"/>
+                <a:headEnd/>
+                <a:tailEnd/>
+              </a14:hiddenLine>
+            </a:ext>
+          </a:extLst>
+        </p:spPr>
+        <p:txBody>
+          <a:bodyPr/>
+          <a:lstStyle>
+            <a:lvl1pPr eaLnBrk="0" hangingPunct="0">
+              <a:defRPr>
+                <a:solidFill>
+                  <a:schemeClr val="tx1"/>
+                </a:solidFill>
+                <a:latin typeface="Arial" panose="020B0604020202020204" pitchFamily="34" charset="0"/>
+              </a:defRPr>
+            </a:lvl1pPr>
+            <a:lvl2pPr marL="742950" indent="-285750" eaLnBrk="0" hangingPunct="0">
+              <a:defRPr>
+                <a:solidFill>
+                  <a:schemeClr val="tx1"/>
+                </a:solidFill>
+                <a:latin typeface="Arial" panose="020B0604020202020204" pitchFamily="34" charset="0"/>
+              </a:defRPr>
+            </a:lvl2pPr>
+            <a:lvl3pPr marL="1143000" indent="-228600" eaLnBrk="0" hangingPunct="0">
+              <a:defRPr>
+                <a:solidFill>
+                  <a:schemeClr val="tx1"/>
+                </a:solidFill>
+                <a:latin typeface="Arial" panose="020B0604020202020204" pitchFamily="34" charset="0"/>
+              </a:defRPr>
+            </a:lvl3pPr>
+            <a:lvl4pPr marL="1600200" indent="-228600" eaLnBrk="0" hangingPunct="0">
+              <a:defRPr>
+                <a:solidFill>
+                  <a:schemeClr val="tx1"/>
+                </a:solidFill>
+                <a:latin typeface="Arial" panose="020B0604020202020204" pitchFamily="34" charset="0"/>
+              </a:defRPr>
+            </a:lvl4pPr>
+            <a:lvl5pPr marL="2057400" indent="-228600" eaLnBrk="0" hangingPunct="0">
+              <a:defRPr>
+                <a:solidFill>
+                  <a:schemeClr val="tx1"/>
+                </a:solidFill>
+                <a:latin typeface="Arial" panose="020B0604020202020204" pitchFamily="34" charset="0"/>
+              </a:defRPr>
+            </a:lvl5pPr>
+            <a:lvl6pPr marL="2514600" indent="-228600" eaLnBrk="0" fontAlgn="base" hangingPunct="0">
+              <a:spcBef>
+                <a:spcPct val="0"/>
+              </a:spcBef>
+              <a:spcAft>
+                <a:spcPct val="0"/>
+              </a:spcAft>
+              <a:defRPr>
+                <a:solidFill>
+                  <a:schemeClr val="tx1"/>
+                </a:solidFill>
+                <a:latin typeface="Arial" panose="020B0604020202020204" pitchFamily="34" charset="0"/>
+              </a:defRPr>
+            </a:lvl6pPr>
+            <a:lvl7pPr marL="2971800" indent="-228600" eaLnBrk="0" fontAlgn="base" hangingPunct="0">
+              <a:spcBef>
+                <a:spcPct val="0"/>
+              </a:spcBef>
+              <a:spcAft>
+                <a:spcPct val="0"/>
+              </a:spcAft>
+              <a:defRPr>
+                <a:solidFill>
+                  <a:schemeClr val="tx1"/>
+                </a:solidFill>
+                <a:latin typeface="Arial" panose="020B0604020202020204" pitchFamily="34" charset="0"/>
+              </a:defRPr>
+            </a:lvl7pPr>
+            <a:lvl8pPr marL="3429000" indent="-228600" eaLnBrk="0" fontAlgn="base" hangingPunct="0">
+              <a:spcBef>
+                <a:spcPct val="0"/>
+              </a:spcBef>
+              <a:spcAft>
+                <a:spcPct val="0"/>
+              </a:spcAft>
+              <a:defRPr>
+                <a:solidFill>
+                  <a:schemeClr val="tx1"/>
+                </a:solidFill>
+                <a:latin typeface="Arial" panose="020B0604020202020204" pitchFamily="34" charset="0"/>
+              </a:defRPr>
+            </a:lvl8pPr>
+            <a:lvl9pPr marL="3886200" indent="-228600" eaLnBrk="0" fontAlgn="base" hangingPunct="0">
+              <a:spcBef>
+                <a:spcPct val="0"/>
+              </a:spcBef>
+              <a:spcAft>
+                <a:spcPct val="0"/>
+              </a:spcAft>
+              <a:defRPr>
+                <a:solidFill>
+                  <a:schemeClr val="tx1"/>
+                </a:solidFill>
+                <a:latin typeface="Arial" panose="020B0604020202020204" pitchFamily="34" charset="0"/>
+              </a:defRPr>
+            </a:lvl9pPr>
+          </a:lstStyle>
+          <a:p>
+            <a:pPr eaLnBrk="1" hangingPunct="1"/>
+            <a:fld id="{8840FCE9-7EA8-477A-BB69-EAB1D9912F2C}" type="slidenum">
+              <a:rPr lang="en-US" altLang="en-US"/>
+              <a:pPr eaLnBrk="1" hangingPunct="1"/>
+              <a:t>64</a:t>
+            </a:fld>
+            <a:endParaRPr lang="en-US" altLang="en-US"/>
+          </a:p>
+        </p:txBody>
+      </p:sp>
+      <p:sp>
+        <p:nvSpPr>
+          <p:cNvPr id="59395" name="Rectangle 2"/>
+          <p:cNvSpPr>
+            <a:spLocks noGrp="1" noChangeArrowheads="1"/>
+          </p:cNvSpPr>
+          <p:nvPr>
+            <p:ph type="title"/>
+          </p:nvPr>
+        </p:nvSpPr>
+        <p:spPr/>
+        <p:txBody>
+          <a:bodyPr/>
+          <a:lstStyle/>
+          <a:p>
+            <a:pPr eaLnBrk="1" hangingPunct="1"/>
+            <a:r>
+              <a:rPr lang="en-US" altLang="en-US" dirty="0" smtClean="0"/>
+              <a:t>Summary</a:t>
+            </a:r>
+            <a:br>
+              <a:rPr lang="en-US" altLang="en-US" dirty="0" smtClean="0"/>
+            </a:br>
+            <a:endParaRPr lang="en-US" altLang="en-US" dirty="0" smtClean="0"/>
+          </a:p>
+        </p:txBody>
+      </p:sp>
+      <p:sp>
+        <p:nvSpPr>
+          <p:cNvPr id="59396" name="Rectangle 3"/>
+          <p:cNvSpPr>
+            <a:spLocks noGrp="1" noChangeArrowheads="1"/>
+          </p:cNvSpPr>
+          <p:nvPr>
+            <p:ph type="body" idx="1"/>
+          </p:nvPr>
+        </p:nvSpPr>
+        <p:spPr/>
+        <p:txBody>
+          <a:bodyPr/>
+          <a:lstStyle/>
+          <a:p>
+            <a:pPr eaLnBrk="1" hangingPunct="1"/>
+            <a:r>
+              <a:rPr lang="en-US" altLang="en-US" sz="2600" smtClean="0"/>
+              <a:t>Use of problem space analysis to facilitate real-time planning </a:t>
+            </a:r>
+          </a:p>
+          <a:p>
+            <a:pPr lvl="1" eaLnBrk="1" hangingPunct="1"/>
+            <a:r>
+              <a:rPr lang="en-US" altLang="en-US" sz="2200" smtClean="0"/>
+              <a:t>plan library creation</a:t>
+            </a:r>
+          </a:p>
+          <a:p>
+            <a:pPr lvl="1" eaLnBrk="1" hangingPunct="1"/>
+            <a:r>
+              <a:rPr lang="en-US" altLang="en-US" sz="2200" smtClean="0"/>
+              <a:t>algorithm selection</a:t>
+            </a:r>
+          </a:p>
+          <a:p>
+            <a:pPr lvl="1" eaLnBrk="1" hangingPunct="1"/>
+            <a:r>
+              <a:rPr lang="en-US" altLang="en-US" sz="2200" smtClean="0"/>
+              <a:t>problem decomposition</a:t>
+            </a:r>
+          </a:p>
+          <a:p>
+            <a:pPr eaLnBrk="1" hangingPunct="1"/>
+            <a:r>
+              <a:rPr lang="en-US" altLang="en-US" sz="2600" smtClean="0"/>
+              <a:t>Use of sampling and interpolation techniques to create problem space maps</a:t>
+            </a:r>
+          </a:p>
+          <a:p>
+            <a:pPr lvl="1" eaLnBrk="1" hangingPunct="1"/>
+            <a:r>
+              <a:rPr lang="en-US" altLang="en-US" sz="2200" smtClean="0"/>
+              <a:t>traditional techniques</a:t>
+            </a:r>
+          </a:p>
+          <a:p>
+            <a:pPr lvl="1" eaLnBrk="1" hangingPunct="1"/>
+            <a:r>
+              <a:rPr lang="en-US" altLang="en-US" sz="2200" smtClean="0"/>
+              <a:t>domain-based hints</a:t>
+            </a:r>
+          </a:p>
+          <a:p>
+            <a:pPr lvl="1" eaLnBrk="1" hangingPunct="1"/>
+            <a:r>
+              <a:rPr lang="en-US" altLang="en-US" sz="2200" smtClean="0"/>
+              <a:t>informed kernel selection</a:t>
+            </a:r>
+          </a:p>
+        </p:txBody>
+      </p:sp>
+    </p:spTree>
+  </p:cSld>
+  <p:clrMapOvr>
+    <a:masterClrMapping/>
+  </p:clrMapOvr>
+  <p:timing>
+    <p:tnLst>
+      <p:par>
+        <p:cTn id="1" dur="indefinite" restart="never" nodeType="tmRoot"/>
+      </p:par>
+    </p:tnLst>
+  </p:timing>
+</p:sld>
+</file>
+
+<file path=ppt/slides/slide65.xml><?xml version="1.0" encoding="utf-8"?>
+<p:sld xmlns:a="http://schemas.openxmlformats.org/drawingml/2006/main" xmlns:r="http://schemas.openxmlformats.org/officeDocument/2006/relationships" xmlns:p="http://schemas.openxmlformats.org/presentationml/2006/main">
+  <p:cSld>
+    <p:spTree>
+      <p:nvGrpSpPr>
+        <p:cNvPr id="1" name=""/>
+        <p:cNvGrpSpPr/>
+        <p:nvPr/>
+      </p:nvGrpSpPr>
+      <p:grpSpPr>
+        <a:xfrm>
+          <a:off x="0" y="0"/>
+          <a:ext cx="0" cy="0"/>
+          <a:chOff x="0" y="0"/>
+          <a:chExt cx="0" cy="0"/>
+        </a:xfrm>
+      </p:grpSpPr>
+      <p:sp>
+        <p:nvSpPr>
+          <p:cNvPr id="60418" name="Title 1"/>
+          <p:cNvSpPr>
+            <a:spLocks noGrp="1"/>
+          </p:cNvSpPr>
+          <p:nvPr>
+            <p:ph type="title"/>
+          </p:nvPr>
+        </p:nvSpPr>
+        <p:spPr/>
+        <p:txBody>
+          <a:bodyPr/>
+          <a:lstStyle/>
+          <a:p>
+            <a:r>
+              <a:rPr lang="en-US" altLang="en-US" dirty="0" smtClean="0"/>
+              <a:t>References</a:t>
+            </a:r>
+            <a:br>
+              <a:rPr lang="en-US" altLang="en-US" dirty="0" smtClean="0"/>
+            </a:br>
+            <a:endParaRPr lang="en-US" altLang="en-US" dirty="0" smtClean="0"/>
+          </a:p>
+        </p:txBody>
+      </p:sp>
+      <p:sp>
+        <p:nvSpPr>
+          <p:cNvPr id="60419" name="Content Placeholder 2"/>
+          <p:cNvSpPr>
+            <a:spLocks noGrp="1"/>
+          </p:cNvSpPr>
+          <p:nvPr>
+            <p:ph idx="1"/>
+          </p:nvPr>
+        </p:nvSpPr>
+        <p:spPr/>
+        <p:txBody>
+          <a:bodyPr/>
+          <a:lstStyle/>
+          <a:p>
+            <a:r>
+              <a:rPr lang="en-US" altLang="en-US" sz="1600" smtClean="0"/>
+              <a:t>Bulka (2009) “Efficient Planning Using Plan Libraries to Capture the Structure of the State Space”</a:t>
+            </a:r>
+          </a:p>
+          <a:p>
+            <a:pPr eaLnBrk="1" hangingPunct="1"/>
+            <a:r>
+              <a:rPr lang="en-US" altLang="en-US" sz="1600" smtClean="0"/>
+              <a:t>Gopal &amp; Starkschall (2002) “Plan space: representation of treatment plans in multidimensional space”</a:t>
+            </a:r>
+          </a:p>
+          <a:p>
+            <a:r>
+              <a:rPr lang="en-US" altLang="en-US" sz="1600" smtClean="0"/>
+              <a:t>Hoffman (2001) “Local Search Topology in Planning Benchmarks: An Empirical Analysis”</a:t>
+            </a:r>
+          </a:p>
+          <a:p>
+            <a:pPr eaLnBrk="1" hangingPunct="1"/>
+            <a:r>
+              <a:rPr lang="en-US" altLang="en-US" sz="1600" smtClean="0"/>
+              <a:t>Hoffman &amp; Nebel (2001) “The FF Planning System: Fast Plan Generation Through Heuristic Search”</a:t>
+            </a:r>
+          </a:p>
+          <a:p>
+            <a:pPr eaLnBrk="1" hangingPunct="1"/>
+            <a:r>
+              <a:rPr lang="en-US" altLang="en-US" sz="1600" smtClean="0"/>
+              <a:t>Onder &amp; Pollack (1996) “Contingency Selection in Plan Generation”</a:t>
+            </a:r>
+          </a:p>
+          <a:p>
+            <a:r>
+              <a:rPr lang="en-US" altLang="en-US" sz="1600" smtClean="0"/>
+              <a:t>Kondaris (2008) “Autonomous Robot Skill Acquisition”</a:t>
+            </a:r>
+          </a:p>
+          <a:p>
+            <a:pPr eaLnBrk="1" hangingPunct="1"/>
+            <a:r>
+              <a:rPr lang="en-US" altLang="en-US" sz="1600" smtClean="0"/>
+              <a:t>Miner (2009) “Rule Abstraction: Understanding Emergent Behavior in Swarm Systems”</a:t>
+            </a:r>
+          </a:p>
+          <a:p>
+            <a:pPr eaLnBrk="1" hangingPunct="1"/>
+            <a:r>
+              <a:rPr lang="en-US" altLang="en-US" sz="1600" smtClean="0"/>
+              <a:t>Smyth &amp; McKenny (2001) “Competence Models and the Maintenance Problem”</a:t>
+            </a:r>
+          </a:p>
+          <a:p>
+            <a:pPr eaLnBrk="1" hangingPunct="1"/>
+            <a:r>
+              <a:rPr lang="en-US" altLang="en-US" sz="1600" smtClean="0"/>
+              <a:t>Rosen, et. al. (2005) “Interactively exploring optimized treatment plans”</a:t>
+            </a:r>
+          </a:p>
+          <a:p>
+            <a:pPr eaLnBrk="1" hangingPunct="1"/>
+            <a:r>
+              <a:rPr lang="en-US" altLang="en-US" sz="1600" smtClean="0"/>
+              <a:t>Trinquart (2003) “Analyzing Reachability within Plan Space”</a:t>
+            </a:r>
+          </a:p>
+        </p:txBody>
+      </p:sp>
+      <p:sp>
+        <p:nvSpPr>
+          <p:cNvPr id="60420" name="Slide Number Placeholder 3"/>
+          <p:cNvSpPr>
+            <a:spLocks noGrp="1"/>
+          </p:cNvSpPr>
+          <p:nvPr>
+            <p:ph type="sldNum" sz="quarter" idx="12"/>
+          </p:nvPr>
+        </p:nvSpPr>
+        <p:spPr>
+          <a:noFill/>
+          <a:ln/>
+          <a:extLst>
+            <a:ext uri="{909E8E84-426E-40DD-AFC4-6F175D3DCCD1}">
+              <a14:hiddenFill xmlns:a14="http://schemas.microsoft.com/office/drawing/2010/main">
+                <a:solidFill>
+                  <a:srgbClr val="FFFFFF"/>
+                </a:solidFill>
+              </a14:hiddenFill>
+            </a:ext>
+            <a:ext uri="{91240B29-F687-4F45-9708-019B960494DF}">
+              <a14:hiddenLine xmlns:a14="http://schemas.microsoft.com/office/drawing/2010/main" w="9525">
+                <a:solidFill>
+                  <a:srgbClr val="000000"/>
+                </a:solidFill>
+                <a:miter lim="800000"/>
+                <a:headEnd/>
+                <a:tailEnd/>
+              </a14:hiddenLine>
+            </a:ext>
+          </a:extLst>
+        </p:spPr>
+        <p:txBody>
+          <a:bodyPr/>
+          <a:lstStyle>
+            <a:lvl1pPr eaLnBrk="0" hangingPunct="0">
+              <a:defRPr>
+                <a:solidFill>
+                  <a:schemeClr val="tx1"/>
+                </a:solidFill>
+                <a:latin typeface="Arial" panose="020B0604020202020204" pitchFamily="34" charset="0"/>
+              </a:defRPr>
+            </a:lvl1pPr>
+            <a:lvl2pPr marL="742950" indent="-285750" eaLnBrk="0" hangingPunct="0">
+              <a:defRPr>
+                <a:solidFill>
+                  <a:schemeClr val="tx1"/>
+                </a:solidFill>
+                <a:latin typeface="Arial" panose="020B0604020202020204" pitchFamily="34" charset="0"/>
+              </a:defRPr>
+            </a:lvl2pPr>
+            <a:lvl3pPr marL="1143000" indent="-228600" eaLnBrk="0" hangingPunct="0">
+              <a:defRPr>
+                <a:solidFill>
+                  <a:schemeClr val="tx1"/>
+                </a:solidFill>
+                <a:latin typeface="Arial" panose="020B0604020202020204" pitchFamily="34" charset="0"/>
+              </a:defRPr>
+            </a:lvl3pPr>
+            <a:lvl4pPr marL="1600200" indent="-228600" eaLnBrk="0" hangingPunct="0">
+              <a:defRPr>
+                <a:solidFill>
+                  <a:schemeClr val="tx1"/>
+                </a:solidFill>
+                <a:latin typeface="Arial" panose="020B0604020202020204" pitchFamily="34" charset="0"/>
+              </a:defRPr>
+            </a:lvl4pPr>
+            <a:lvl5pPr marL="2057400" indent="-228600" eaLnBrk="0" hangingPunct="0">
+              <a:defRPr>
+                <a:solidFill>
+                  <a:schemeClr val="tx1"/>
+                </a:solidFill>
+                <a:latin typeface="Arial" panose="020B0604020202020204" pitchFamily="34" charset="0"/>
+              </a:defRPr>
+            </a:lvl5pPr>
+            <a:lvl6pPr marL="2514600" indent="-228600" eaLnBrk="0" fontAlgn="base" hangingPunct="0">
+              <a:spcBef>
+                <a:spcPct val="0"/>
+              </a:spcBef>
+              <a:spcAft>
+                <a:spcPct val="0"/>
+              </a:spcAft>
+              <a:defRPr>
+                <a:solidFill>
+                  <a:schemeClr val="tx1"/>
+                </a:solidFill>
+                <a:latin typeface="Arial" panose="020B0604020202020204" pitchFamily="34" charset="0"/>
+              </a:defRPr>
+            </a:lvl6pPr>
+            <a:lvl7pPr marL="2971800" indent="-228600" eaLnBrk="0" fontAlgn="base" hangingPunct="0">
+              <a:spcBef>
+                <a:spcPct val="0"/>
+              </a:spcBef>
+              <a:spcAft>
+                <a:spcPct val="0"/>
+              </a:spcAft>
+              <a:defRPr>
+                <a:solidFill>
+                  <a:schemeClr val="tx1"/>
+                </a:solidFill>
+                <a:latin typeface="Arial" panose="020B0604020202020204" pitchFamily="34" charset="0"/>
+              </a:defRPr>
+            </a:lvl7pPr>
+            <a:lvl8pPr marL="3429000" indent="-228600" eaLnBrk="0" fontAlgn="base" hangingPunct="0">
+              <a:spcBef>
+                <a:spcPct val="0"/>
+              </a:spcBef>
+              <a:spcAft>
+                <a:spcPct val="0"/>
+              </a:spcAft>
+              <a:defRPr>
+                <a:solidFill>
+                  <a:schemeClr val="tx1"/>
+                </a:solidFill>
+                <a:latin typeface="Arial" panose="020B0604020202020204" pitchFamily="34" charset="0"/>
+              </a:defRPr>
+            </a:lvl8pPr>
+            <a:lvl9pPr marL="3886200" indent="-228600" eaLnBrk="0" fontAlgn="base" hangingPunct="0">
+              <a:spcBef>
+                <a:spcPct val="0"/>
+              </a:spcBef>
+              <a:spcAft>
+                <a:spcPct val="0"/>
+              </a:spcAft>
+              <a:defRPr>
+                <a:solidFill>
+                  <a:schemeClr val="tx1"/>
+                </a:solidFill>
+                <a:latin typeface="Arial" panose="020B0604020202020204" pitchFamily="34" charset="0"/>
+              </a:defRPr>
+            </a:lvl9pPr>
+          </a:lstStyle>
+          <a:p>
+            <a:pPr eaLnBrk="1" hangingPunct="1"/>
+            <a:fld id="{C5047C29-7B47-4D60-AFC2-1146D3E8AC4A}" type="slidenum">
+              <a:rPr lang="en-US" altLang="en-US"/>
+              <a:pPr eaLnBrk="1" hangingPunct="1"/>
+              <a:t>65</a:t>
+            </a:fld>
+            <a:endParaRPr lang="en-US" altLang="en-US"/>
+          </a:p>
+        </p:txBody>
+      </p:sp>
+    </p:spTree>
+  </p:cSld>
+  <p:clrMapOvr>
+    <a:masterClrMapping/>
+  </p:clrMapOvr>
+  <p:timing>
+    <p:tnLst>
+      <p:par>
+        <p:cTn id="1" dur="indefinite" restart="never" nodeType="tmRoot"/>
+      </p:par>
+    </p:tnLst>
+  </p:timing>
+</p:sld>
+</file>
+
+<file path=ppt/slides/slide66.xml><?xml version="1.0" encoding="utf-8"?>
+<p:sld xmlns:a="http://schemas.openxmlformats.org/drawingml/2006/main" xmlns:r="http://schemas.openxmlformats.org/officeDocument/2006/relationships" xmlns:p="http://schemas.openxmlformats.org/presentationml/2006/main">
+  <p:cSld>
+    <p:spTree>
+      <p:nvGrpSpPr>
+        <p:cNvPr id="1" name=""/>
+        <p:cNvGrpSpPr/>
+        <p:nvPr/>
+      </p:nvGrpSpPr>
+      <p:grpSpPr>
+        <a:xfrm>
+          <a:off x="0" y="0"/>
+          <a:ext cx="0" cy="0"/>
+          <a:chOff x="0" y="0"/>
+          <a:chExt cx="0" cy="0"/>
+        </a:xfrm>
+      </p:grpSpPr>
+      <p:sp>
+        <p:nvSpPr>
+          <p:cNvPr id="63490" name="Title 1"/>
+          <p:cNvSpPr>
+            <a:spLocks noGrp="1"/>
+          </p:cNvSpPr>
+          <p:nvPr>
+            <p:ph type="title"/>
+          </p:nvPr>
+        </p:nvSpPr>
+        <p:spPr/>
+        <p:txBody>
+          <a:bodyPr/>
+          <a:lstStyle/>
+          <a:p>
+            <a:r>
+              <a:rPr lang="en-US" altLang="en-US" smtClean="0"/>
+              <a:t>Related Work –</a:t>
+            </a:r>
+            <a:br>
+              <a:rPr lang="en-US" altLang="en-US" smtClean="0"/>
+            </a:br>
+            <a:r>
+              <a:rPr lang="en-US" altLang="en-US" smtClean="0"/>
+              <a:t>Contingency Planning</a:t>
+            </a:r>
+          </a:p>
+        </p:txBody>
+      </p:sp>
+      <p:sp>
+        <p:nvSpPr>
+          <p:cNvPr id="63491" name="Slide Number Placeholder 3"/>
+          <p:cNvSpPr>
+            <a:spLocks noGrp="1"/>
+          </p:cNvSpPr>
+          <p:nvPr>
+            <p:ph type="sldNum" sz="quarter" idx="12"/>
+          </p:nvPr>
+        </p:nvSpPr>
+        <p:spPr>
+          <a:noFill/>
+          <a:ln/>
+          <a:extLst>
+            <a:ext uri="{909E8E84-426E-40DD-AFC4-6F175D3DCCD1}">
+              <a14:hiddenFill xmlns:a14="http://schemas.microsoft.com/office/drawing/2010/main">
+                <a:solidFill>
+                  <a:srgbClr val="FFFFFF"/>
+                </a:solidFill>
+              </a14:hiddenFill>
+            </a:ext>
+            <a:ext uri="{91240B29-F687-4F45-9708-019B960494DF}">
+              <a14:hiddenLine xmlns:a14="http://schemas.microsoft.com/office/drawing/2010/main" w="9525">
+                <a:solidFill>
+                  <a:srgbClr val="000000"/>
+                </a:solidFill>
+                <a:miter lim="800000"/>
+                <a:headEnd/>
+                <a:tailEnd/>
+              </a14:hiddenLine>
+            </a:ext>
+          </a:extLst>
+        </p:spPr>
+        <p:txBody>
+          <a:bodyPr/>
+          <a:lstStyle>
+            <a:lvl1pPr eaLnBrk="0" hangingPunct="0">
+              <a:defRPr>
+                <a:solidFill>
+                  <a:schemeClr val="tx1"/>
+                </a:solidFill>
+                <a:latin typeface="Arial" panose="020B0604020202020204" pitchFamily="34" charset="0"/>
+              </a:defRPr>
+            </a:lvl1pPr>
+            <a:lvl2pPr marL="742950" indent="-285750" eaLnBrk="0" hangingPunct="0">
+              <a:defRPr>
+                <a:solidFill>
+                  <a:schemeClr val="tx1"/>
+                </a:solidFill>
+                <a:latin typeface="Arial" panose="020B0604020202020204" pitchFamily="34" charset="0"/>
+              </a:defRPr>
+            </a:lvl2pPr>
+            <a:lvl3pPr marL="1143000" indent="-228600" eaLnBrk="0" hangingPunct="0">
+              <a:defRPr>
+                <a:solidFill>
+                  <a:schemeClr val="tx1"/>
+                </a:solidFill>
+                <a:latin typeface="Arial" panose="020B0604020202020204" pitchFamily="34" charset="0"/>
+              </a:defRPr>
+            </a:lvl3pPr>
+            <a:lvl4pPr marL="1600200" indent="-228600" eaLnBrk="0" hangingPunct="0">
+              <a:defRPr>
+                <a:solidFill>
+                  <a:schemeClr val="tx1"/>
+                </a:solidFill>
+                <a:latin typeface="Arial" panose="020B0604020202020204" pitchFamily="34" charset="0"/>
+              </a:defRPr>
+            </a:lvl4pPr>
+            <a:lvl5pPr marL="2057400" indent="-228600" eaLnBrk="0" hangingPunct="0">
+              <a:defRPr>
+                <a:solidFill>
+                  <a:schemeClr val="tx1"/>
+                </a:solidFill>
+                <a:latin typeface="Arial" panose="020B0604020202020204" pitchFamily="34" charset="0"/>
+              </a:defRPr>
+            </a:lvl5pPr>
+            <a:lvl6pPr marL="2514600" indent="-228600" eaLnBrk="0" fontAlgn="base" hangingPunct="0">
+              <a:spcBef>
+                <a:spcPct val="0"/>
+              </a:spcBef>
+              <a:spcAft>
+                <a:spcPct val="0"/>
+              </a:spcAft>
+              <a:defRPr>
+                <a:solidFill>
+                  <a:schemeClr val="tx1"/>
+                </a:solidFill>
+                <a:latin typeface="Arial" panose="020B0604020202020204" pitchFamily="34" charset="0"/>
+              </a:defRPr>
+            </a:lvl6pPr>
+            <a:lvl7pPr marL="2971800" indent="-228600" eaLnBrk="0" fontAlgn="base" hangingPunct="0">
+              <a:spcBef>
+                <a:spcPct val="0"/>
+              </a:spcBef>
+              <a:spcAft>
+                <a:spcPct val="0"/>
+              </a:spcAft>
+              <a:defRPr>
+                <a:solidFill>
+                  <a:schemeClr val="tx1"/>
+                </a:solidFill>
+                <a:latin typeface="Arial" panose="020B0604020202020204" pitchFamily="34" charset="0"/>
+              </a:defRPr>
+            </a:lvl7pPr>
+            <a:lvl8pPr marL="3429000" indent="-228600" eaLnBrk="0" fontAlgn="base" hangingPunct="0">
+              <a:spcBef>
+                <a:spcPct val="0"/>
+              </a:spcBef>
+              <a:spcAft>
+                <a:spcPct val="0"/>
+              </a:spcAft>
+              <a:defRPr>
+                <a:solidFill>
+                  <a:schemeClr val="tx1"/>
+                </a:solidFill>
+                <a:latin typeface="Arial" panose="020B0604020202020204" pitchFamily="34" charset="0"/>
+              </a:defRPr>
+            </a:lvl8pPr>
+            <a:lvl9pPr marL="3886200" indent="-228600" eaLnBrk="0" fontAlgn="base" hangingPunct="0">
+              <a:spcBef>
+                <a:spcPct val="0"/>
+              </a:spcBef>
+              <a:spcAft>
+                <a:spcPct val="0"/>
+              </a:spcAft>
+              <a:defRPr>
+                <a:solidFill>
+                  <a:schemeClr val="tx1"/>
+                </a:solidFill>
+                <a:latin typeface="Arial" panose="020B0604020202020204" pitchFamily="34" charset="0"/>
+              </a:defRPr>
+            </a:lvl9pPr>
+          </a:lstStyle>
+          <a:p>
+            <a:pPr eaLnBrk="1" hangingPunct="1"/>
+            <a:fld id="{35E8037D-8104-4D43-A200-A2C3F6CCCDC0}" type="slidenum">
+              <a:rPr lang="en-US" altLang="en-US"/>
+              <a:pPr eaLnBrk="1" hangingPunct="1"/>
+              <a:t>66</a:t>
+            </a:fld>
+            <a:endParaRPr lang="en-US" altLang="en-US"/>
+          </a:p>
+        </p:txBody>
+      </p:sp>
+      <p:pic>
+        <p:nvPicPr>
+          <p:cNvPr id="63492" name="Picture 2"/>
+          <p:cNvPicPr>
+            <a:picLocks noGrp="1" noChangeAspect="1" noChangeArrowheads="1"/>
+          </p:cNvPicPr>
+          <p:nvPr>
+            <p:ph idx="1"/>
+          </p:nvPr>
+        </p:nvPicPr>
+        <p:blipFill>
+          <a:blip r:embed="rId2">
+            <a:extLst>
+              <a:ext uri="{28A0092B-C50C-407E-A947-70E740481C1C}">
+                <a14:useLocalDpi xmlns:a14="http://schemas.microsoft.com/office/drawing/2010/main" val="0"/>
+              </a:ext>
+            </a:extLst>
+          </a:blip>
+          <a:srcRect/>
+          <a:stretch>
+            <a:fillRect/>
+          </a:stretch>
+        </p:blipFill>
+        <p:spPr>
+          <a:xfrm>
+            <a:off x="457200" y="1524000"/>
+            <a:ext cx="8143875" cy="3894138"/>
+          </a:xfrm>
+        </p:spPr>
+      </p:pic>
+      <p:sp>
+        <p:nvSpPr>
+          <p:cNvPr id="63493" name="TextBox 6"/>
+          <p:cNvSpPr txBox="1">
+            <a:spLocks noChangeArrowheads="1"/>
+          </p:cNvSpPr>
+          <p:nvPr/>
+        </p:nvSpPr>
+        <p:spPr bwMode="auto">
+          <a:xfrm>
+            <a:off x="609600" y="5486400"/>
+            <a:ext cx="2582863" cy="369888"/>
+          </a:xfrm>
+          <a:prstGeom prst="rect">
+            <a:avLst/>
+          </a:prstGeom>
+          <a:noFill/>
+          <a:ln>
+            <a:noFill/>
+          </a:ln>
+          <a:extLst>
+            <a:ext uri="{909E8E84-426E-40DD-AFC4-6F175D3DCCD1}">
+              <a14:hiddenFill xmlns:a14="http://schemas.microsoft.com/office/drawing/2010/main">
+                <a:solidFill>
+                  <a:srgbClr val="FFFFFF"/>
+                </a:solidFill>
+              </a14:hiddenFill>
+            </a:ext>
+            <a:ext uri="{91240B29-F687-4F45-9708-019B960494DF}">
+              <a14:hiddenLine xmlns:a14="http://schemas.microsoft.com/office/drawing/2010/main" w="9525">
+                <a:solidFill>
+                  <a:srgbClr val="000000"/>
+                </a:solidFill>
+                <a:miter lim="800000"/>
+                <a:headEnd/>
+                <a:tailEnd/>
+              </a14:hiddenLine>
+            </a:ext>
+          </a:extLst>
+        </p:spPr>
+        <p:txBody>
+          <a:bodyPr wrap="none">
+            <a:spAutoFit/>
+          </a:bodyPr>
+          <a:lstStyle>
+            <a:lvl1pPr eaLnBrk="0" hangingPunct="0">
+              <a:defRPr>
+                <a:solidFill>
+                  <a:schemeClr val="tx1"/>
+                </a:solidFill>
+                <a:latin typeface="Arial" panose="020B0604020202020204" pitchFamily="34" charset="0"/>
+              </a:defRPr>
+            </a:lvl1pPr>
+            <a:lvl2pPr marL="742950" indent="-285750" eaLnBrk="0" hangingPunct="0">
+              <a:defRPr>
+                <a:solidFill>
+                  <a:schemeClr val="tx1"/>
+                </a:solidFill>
+                <a:latin typeface="Arial" panose="020B0604020202020204" pitchFamily="34" charset="0"/>
+              </a:defRPr>
+            </a:lvl2pPr>
+            <a:lvl3pPr marL="1143000" indent="-228600" eaLnBrk="0" hangingPunct="0">
+              <a:defRPr>
+                <a:solidFill>
+                  <a:schemeClr val="tx1"/>
+                </a:solidFill>
+                <a:latin typeface="Arial" panose="020B0604020202020204" pitchFamily="34" charset="0"/>
+              </a:defRPr>
+            </a:lvl3pPr>
+            <a:lvl4pPr marL="1600200" indent="-228600" eaLnBrk="0" hangingPunct="0">
+              <a:defRPr>
+                <a:solidFill>
+                  <a:schemeClr val="tx1"/>
+                </a:solidFill>
+                <a:latin typeface="Arial" panose="020B0604020202020204" pitchFamily="34" charset="0"/>
+              </a:defRPr>
+            </a:lvl4pPr>
+            <a:lvl5pPr marL="2057400" indent="-228600" eaLnBrk="0" hangingPunct="0">
+              <a:defRPr>
+                <a:solidFill>
+                  <a:schemeClr val="tx1"/>
+                </a:solidFill>
+                <a:latin typeface="Arial" panose="020B0604020202020204" pitchFamily="34" charset="0"/>
+              </a:defRPr>
+            </a:lvl5pPr>
+            <a:lvl6pPr marL="2514600" indent="-228600" eaLnBrk="0" fontAlgn="base" hangingPunct="0">
+              <a:spcBef>
+                <a:spcPct val="0"/>
+              </a:spcBef>
+              <a:spcAft>
+                <a:spcPct val="0"/>
+              </a:spcAft>
+              <a:defRPr>
+                <a:solidFill>
+                  <a:schemeClr val="tx1"/>
+                </a:solidFill>
+                <a:latin typeface="Arial" panose="020B0604020202020204" pitchFamily="34" charset="0"/>
+              </a:defRPr>
+            </a:lvl6pPr>
+            <a:lvl7pPr marL="2971800" indent="-228600" eaLnBrk="0" fontAlgn="base" hangingPunct="0">
+              <a:spcBef>
+                <a:spcPct val="0"/>
+              </a:spcBef>
+              <a:spcAft>
+                <a:spcPct val="0"/>
+              </a:spcAft>
+              <a:defRPr>
+                <a:solidFill>
+                  <a:schemeClr val="tx1"/>
+                </a:solidFill>
+                <a:latin typeface="Arial" panose="020B0604020202020204" pitchFamily="34" charset="0"/>
+              </a:defRPr>
+            </a:lvl7pPr>
+            <a:lvl8pPr marL="3429000" indent="-228600" eaLnBrk="0" fontAlgn="base" hangingPunct="0">
+              <a:spcBef>
+                <a:spcPct val="0"/>
+              </a:spcBef>
+              <a:spcAft>
+                <a:spcPct val="0"/>
+              </a:spcAft>
+              <a:defRPr>
+                <a:solidFill>
+                  <a:schemeClr val="tx1"/>
+                </a:solidFill>
+                <a:latin typeface="Arial" panose="020B0604020202020204" pitchFamily="34" charset="0"/>
+              </a:defRPr>
+            </a:lvl8pPr>
+            <a:lvl9pPr marL="3886200" indent="-228600" eaLnBrk="0" fontAlgn="base" hangingPunct="0">
+              <a:spcBef>
+                <a:spcPct val="0"/>
+              </a:spcBef>
+              <a:spcAft>
+                <a:spcPct val="0"/>
+              </a:spcAft>
+              <a:defRPr>
+                <a:solidFill>
+                  <a:schemeClr val="tx1"/>
+                </a:solidFill>
+                <a:latin typeface="Arial" panose="020B0604020202020204" pitchFamily="34" charset="0"/>
+              </a:defRPr>
+            </a:lvl9pPr>
+          </a:lstStyle>
+          <a:p>
+            <a:pPr eaLnBrk="1" hangingPunct="1"/>
+            <a:r>
+              <a:rPr lang="en-US" altLang="en-US"/>
+              <a:t>Onder &amp; Pollock (1996)</a:t>
+            </a:r>
+          </a:p>
+        </p:txBody>
+      </p:sp>
+    </p:spTree>
+  </p:cSld>
+  <p:clrMapOvr>
+    <a:masterClrMapping/>
+  </p:clrMapOvr>
+  <p:timing>
+    <p:tnLst>
+      <p:par>
+        <p:cTn id="1" dur="indefinite" restart="never" nodeType="tmRoot"/>
+      </p:par>
+    </p:tnLst>
+  </p:timing>
+</p:sld>
+</file>
+
+<file path=ppt/slides/slide67.xml><?xml version="1.0" encoding="utf-8"?>
+<p:sld xmlns:a="http://schemas.openxmlformats.org/drawingml/2006/main" xmlns:r="http://schemas.openxmlformats.org/officeDocument/2006/relationships" xmlns:p="http://schemas.openxmlformats.org/presentationml/2006/main">
+  <p:cSld>
+    <p:spTree>
+      <p:nvGrpSpPr>
+        <p:cNvPr id="1" name=""/>
+        <p:cNvGrpSpPr/>
+        <p:nvPr/>
+      </p:nvGrpSpPr>
+      <p:grpSpPr>
+        <a:xfrm>
+          <a:off x="0" y="0"/>
+          <a:ext cx="0" cy="0"/>
+          <a:chOff x="0" y="0"/>
+          <a:chExt cx="0" cy="0"/>
+        </a:xfrm>
+      </p:grpSpPr>
+      <p:sp>
+        <p:nvSpPr>
           <p:cNvPr id="64514" name="Title 1"/>
           <p:cNvSpPr>
             <a:spLocks noGrp="1"/>
@@ -49288,7 +49860,7 @@
             <a:fld id="{B36B108A-47C7-44B0-8129-AB7F110D4AE3}" type="slidenum">
               <a:rPr lang="en-US" altLang="en-US"/>
               <a:pPr eaLnBrk="1" hangingPunct="1"/>
-              <a:t>63</a:t>
+              <a:t>67</a:t>
             </a:fld>
             <a:endParaRPr lang="en-US" altLang="en-US"/>
           </a:p>

</xml_diff>